<commit_message>
updating, getting model H working
</commit_message>
<xml_diff>
--- a/doc/2016-04-03_Stein_Proposal_TargetEndogLigand_Kinetics_v2.pptx
+++ b/doc/2016-04-03_Stein_Proposal_TargetEndogLigand_Kinetics_v2.pptx
@@ -5,7 +5,7 @@
     <p:sldMasterId id="2147483648" r:id="rId1"/>
   </p:sldMasterIdLst>
   <p:notesMasterIdLst>
-    <p:notesMasterId r:id="rId17"/>
+    <p:notesMasterId r:id="rId18"/>
   </p:notesMasterIdLst>
   <p:sldIdLst>
     <p:sldId id="256" r:id="rId2"/>
@@ -16,13 +16,14 @@
     <p:sldId id="264" r:id="rId7"/>
     <p:sldId id="262" r:id="rId8"/>
     <p:sldId id="276" r:id="rId9"/>
-    <p:sldId id="266" r:id="rId10"/>
-    <p:sldId id="267" r:id="rId11"/>
-    <p:sldId id="268" r:id="rId12"/>
-    <p:sldId id="269" r:id="rId13"/>
-    <p:sldId id="271" r:id="rId14"/>
-    <p:sldId id="272" r:id="rId15"/>
-    <p:sldId id="275" r:id="rId16"/>
+    <p:sldId id="277" r:id="rId10"/>
+    <p:sldId id="266" r:id="rId11"/>
+    <p:sldId id="267" r:id="rId12"/>
+    <p:sldId id="268" r:id="rId13"/>
+    <p:sldId id="269" r:id="rId14"/>
+    <p:sldId id="271" r:id="rId15"/>
+    <p:sldId id="272" r:id="rId16"/>
+    <p:sldId id="275" r:id="rId17"/>
   </p:sldIdLst>
   <p:sldSz cx="9144000" cy="6858000" type="screen4x3"/>
   <p:notesSz cx="6794500" cy="9918700"/>
@@ -241,7 +242,7 @@
           <a:p>
             <a:fld id="{5D465A10-0B82-EA48-90D7-0A8D45550A5D}" type="datetimeFigureOut">
               <a:rPr lang="en-US" smtClean="0"/>
-              <a:t>7/20/18</a:t>
+              <a:t>7/23/18</a:t>
             </a:fld>
             <a:endParaRPr lang="en-US"/>
           </a:p>
@@ -538,14 +539,14 @@
         <p:spPr>
           <a:extLst>
             <a:ext uri="{909E8E84-426E-40dd-AFC4-6F175D3DCCD1}">
-              <a14:hiddenFill xmlns:a14="http://schemas.microsoft.com/office/drawing/2010/main" xmlns="">
+              <a14:hiddenFill xmlns="" xmlns:a14="http://schemas.microsoft.com/office/drawing/2010/main">
                 <a:solidFill>
                   <a:schemeClr val="accent1"/>
                 </a:solidFill>
               </a14:hiddenFill>
             </a:ext>
             <a:ext uri="{91240B29-F687-4f45-9708-019B960494DF}">
-              <a14:hiddenLine xmlns:a14="http://schemas.microsoft.com/office/drawing/2010/main" xmlns="" w="9525">
+              <a14:hiddenLine xmlns="" xmlns:a14="http://schemas.microsoft.com/office/drawing/2010/main" w="9525">
                 <a:solidFill>
                   <a:schemeClr val="tx1"/>
                 </a:solidFill>
@@ -555,7 +556,7 @@
               </a14:hiddenLine>
             </a:ext>
             <a:ext uri="{AF507438-7753-43e0-B8FC-AC1667EBCBE1}">
-              <a14:hiddenEffects xmlns:a14="http://schemas.microsoft.com/office/drawing/2010/main" xmlns="">
+              <a14:hiddenEffects xmlns="" xmlns:a14="http://schemas.microsoft.com/office/drawing/2010/main">
                 <a:effectLst>
                   <a:outerShdw blurRad="63500" dist="38099" dir="2700000" algn="ctr" rotWithShape="0">
                     <a:schemeClr val="bg2">
@@ -681,7 +682,7 @@
             <a:fld id="{9F6A3678-A141-6547-AEAB-08DD1B5A8997}" type="slidenum">
               <a:rPr lang="en-US" altLang="en-US" sz="1200"/>
               <a:pPr eaLnBrk="1" hangingPunct="1"/>
-              <a:t>15</a:t>
+              <a:t>16</a:t>
             </a:fld>
             <a:endParaRPr lang="en-US" altLang="en-US" sz="1200"/>
           </a:p>
@@ -714,7 +715,7 @@
         <p:spPr>
           <a:extLst>
             <a:ext uri="{AF507438-7753-43e0-B8FC-AC1667EBCBE1}">
-              <a14:hiddenEffects xmlns:a14="http://schemas.microsoft.com/office/drawing/2010/main" xmlns="">
+              <a14:hiddenEffects xmlns="" xmlns:a14="http://schemas.microsoft.com/office/drawing/2010/main">
                 <a:effectLst>
                   <a:outerShdw blurRad="63500" dist="38099" dir="2700000" algn="ctr" rotWithShape="0">
                     <a:schemeClr val="bg2">
@@ -871,14 +872,14 @@
           </a:ln>
           <a:extLst>
             <a:ext uri="{909E8E84-426E-40dd-AFC4-6F175D3DCCD1}">
-              <a14:hiddenFill xmlns="" xmlns:a14="http://schemas.microsoft.com/office/drawing/2010/main">
+              <a14:hiddenFill xmlns:a14="http://schemas.microsoft.com/office/drawing/2010/main" xmlns="">
                 <a:solidFill>
                   <a:srgbClr val="FFFFFF"/>
                 </a:solidFill>
               </a14:hiddenFill>
             </a:ext>
             <a:ext uri="{91240B29-F687-4f45-9708-019B960494DF}">
-              <a14:hiddenLine xmlns="" xmlns:a14="http://schemas.microsoft.com/office/drawing/2010/main" w="9525">
+              <a14:hiddenLine xmlns:a14="http://schemas.microsoft.com/office/drawing/2010/main" xmlns="" w="9525">
                 <a:solidFill>
                   <a:srgbClr val="000000"/>
                 </a:solidFill>
@@ -1042,7 +1043,7 @@
           </a:ln>
           <a:extLst>
             <a:ext uri="{91240B29-F687-4f45-9708-019B960494DF}">
-              <a14:hiddenLine xmlns="" xmlns:a14="http://schemas.microsoft.com/office/drawing/2010/main" w="9525">
+              <a14:hiddenLine xmlns:a14="http://schemas.microsoft.com/office/drawing/2010/main" xmlns="" w="9525">
                 <a:solidFill>
                   <a:srgbClr val="000000"/>
                 </a:solidFill>
@@ -1096,14 +1097,14 @@
           </a:ln>
           <a:extLst>
             <a:ext uri="{909E8E84-426E-40dd-AFC4-6F175D3DCCD1}">
-              <a14:hiddenFill xmlns="" xmlns:a14="http://schemas.microsoft.com/office/drawing/2010/main">
+              <a14:hiddenFill xmlns:a14="http://schemas.microsoft.com/office/drawing/2010/main" xmlns="">
                 <a:solidFill>
                   <a:srgbClr val="FFFFFF"/>
                 </a:solidFill>
               </a14:hiddenFill>
             </a:ext>
             <a:ext uri="{91240B29-F687-4f45-9708-019B960494DF}">
-              <a14:hiddenLine xmlns="" xmlns:a14="http://schemas.microsoft.com/office/drawing/2010/main" w="9525">
+              <a14:hiddenLine xmlns:a14="http://schemas.microsoft.com/office/drawing/2010/main" xmlns="" w="9525">
                 <a:solidFill>
                   <a:srgbClr val="000000"/>
                 </a:solidFill>
@@ -1150,14 +1151,14 @@
           </a:ln>
           <a:extLst>
             <a:ext uri="{909E8E84-426E-40dd-AFC4-6F175D3DCCD1}">
-              <a14:hiddenFill xmlns="" xmlns:a14="http://schemas.microsoft.com/office/drawing/2010/main">
+              <a14:hiddenFill xmlns:a14="http://schemas.microsoft.com/office/drawing/2010/main" xmlns="">
                 <a:solidFill>
                   <a:srgbClr val="FFFFFF"/>
                 </a:solidFill>
               </a14:hiddenFill>
             </a:ext>
             <a:ext uri="{91240B29-F687-4f45-9708-019B960494DF}">
-              <a14:hiddenLine xmlns="" xmlns:a14="http://schemas.microsoft.com/office/drawing/2010/main" w="9525">
+              <a14:hiddenLine xmlns:a14="http://schemas.microsoft.com/office/drawing/2010/main" xmlns="" w="9525">
                 <a:solidFill>
                   <a:srgbClr val="000000"/>
                 </a:solidFill>
@@ -3877,7 +3878,7 @@
           </a:ln>
           <a:extLst>
             <a:ext uri="{91240B29-F687-4f45-9708-019B960494DF}">
-              <a14:hiddenLine xmlns="" xmlns:a14="http://schemas.microsoft.com/office/drawing/2010/main" w="12700">
+              <a14:hiddenLine xmlns:a14="http://schemas.microsoft.com/office/drawing/2010/main" xmlns="" w="12700">
                 <a:solidFill>
                   <a:srgbClr val="000000"/>
                 </a:solidFill>
@@ -3920,17 +3921,17 @@
           </a:ln>
           <a:extLst>
             <a:ext uri="{FAA26D3D-D897-4be2-8F04-BA451C77F1D7}">
-              <ma14:placeholderFlag xmlns="" xmlns:ma14="http://schemas.microsoft.com/office/mac/drawingml/2011/main" val="1"/>
+              <ma14:placeholderFlag xmlns:ma14="http://schemas.microsoft.com/office/mac/drawingml/2011/main" xmlns="" val="1"/>
             </a:ext>
             <a:ext uri="{909E8E84-426E-40dd-AFC4-6F175D3DCCD1}">
-              <a14:hiddenFill xmlns="" xmlns:a14="http://schemas.microsoft.com/office/drawing/2010/main">
+              <a14:hiddenFill xmlns:a14="http://schemas.microsoft.com/office/drawing/2010/main" xmlns="">
                 <a:solidFill>
                   <a:srgbClr val="FFFFFF"/>
                 </a:solidFill>
               </a14:hiddenFill>
             </a:ext>
             <a:ext uri="{91240B29-F687-4f45-9708-019B960494DF}">
-              <a14:hiddenLine xmlns="" xmlns:a14="http://schemas.microsoft.com/office/drawing/2010/main" w="9525">
+              <a14:hiddenLine xmlns:a14="http://schemas.microsoft.com/office/drawing/2010/main" xmlns="" w="9525">
                 <a:solidFill>
                   <a:srgbClr val="000000"/>
                 </a:solidFill>
@@ -3983,17 +3984,17 @@
           </a:ln>
           <a:extLst>
             <a:ext uri="{FAA26D3D-D897-4be2-8F04-BA451C77F1D7}">
-              <ma14:placeholderFlag xmlns="" xmlns:ma14="http://schemas.microsoft.com/office/mac/drawingml/2011/main" val="1"/>
+              <ma14:placeholderFlag xmlns:ma14="http://schemas.microsoft.com/office/mac/drawingml/2011/main" xmlns="" val="1"/>
             </a:ext>
             <a:ext uri="{909E8E84-426E-40dd-AFC4-6F175D3DCCD1}">
-              <a14:hiddenFill xmlns="" xmlns:a14="http://schemas.microsoft.com/office/drawing/2010/main">
+              <a14:hiddenFill xmlns:a14="http://schemas.microsoft.com/office/drawing/2010/main" xmlns="">
                 <a:solidFill>
                   <a:srgbClr val="FFFFFF"/>
                 </a:solidFill>
               </a14:hiddenFill>
             </a:ext>
             <a:ext uri="{91240B29-F687-4f45-9708-019B960494DF}">
-              <a14:hiddenLine xmlns="" xmlns:a14="http://schemas.microsoft.com/office/drawing/2010/main" w="9525">
+              <a14:hiddenLine xmlns:a14="http://schemas.microsoft.com/office/drawing/2010/main" xmlns="" w="9525">
                 <a:solidFill>
                   <a:srgbClr val="000000"/>
                 </a:solidFill>
@@ -4084,14 +4085,14 @@
           </a:ln>
           <a:extLst>
             <a:ext uri="{909E8E84-426E-40dd-AFC4-6F175D3DCCD1}">
-              <a14:hiddenFill xmlns="" xmlns:a14="http://schemas.microsoft.com/office/drawing/2010/main">
+              <a14:hiddenFill xmlns:a14="http://schemas.microsoft.com/office/drawing/2010/main" xmlns="">
                 <a:solidFill>
                   <a:srgbClr val="FFFFFF"/>
                 </a:solidFill>
               </a14:hiddenFill>
             </a:ext>
             <a:ext uri="{91240B29-F687-4f45-9708-019B960494DF}">
-              <a14:hiddenLine xmlns="" xmlns:a14="http://schemas.microsoft.com/office/drawing/2010/main" w="9525">
+              <a14:hiddenLine xmlns:a14="http://schemas.microsoft.com/office/drawing/2010/main" xmlns="" w="9525">
                 <a:solidFill>
                   <a:srgbClr val="000000"/>
                 </a:solidFill>
@@ -5617,7 +5618,7 @@
       </p:grpSpPr>
       <p:sp>
         <p:nvSpPr>
-          <p:cNvPr id="2" name="Title 1"/>
+          <p:cNvPr id="6" name="Title 5"/>
           <p:cNvSpPr>
             <a:spLocks noGrp="1"/>
           </p:cNvSpPr>
@@ -5625,14 +5626,19 @@
             <p:ph type="title"/>
           </p:nvPr>
         </p:nvSpPr>
-        <p:spPr/>
+        <p:spPr>
+          <a:xfrm>
+            <a:off x="722313" y="2805995"/>
+            <a:ext cx="7772400" cy="1261884"/>
+          </a:xfrm>
+        </p:spPr>
         <p:txBody>
           <a:bodyPr/>
           <a:lstStyle/>
           <a:p>
             <a:r>
               <a:rPr lang="en-US" dirty="0"/>
-              <a:t>From FDA CP Review - SJIA</a:t>
+              <a:t>backups – additional data</a:t>
             </a:r>
           </a:p>
         </p:txBody>
@@ -5692,34 +5698,10 @@
           </a:p>
         </p:txBody>
       </p:sp>
-      <p:pic>
-        <p:nvPicPr>
-          <p:cNvPr id="6" name="Picture 5"/>
-          <p:cNvPicPr>
-            <a:picLocks noChangeAspect="1"/>
-          </p:cNvPicPr>
-          <p:nvPr/>
-        </p:nvPicPr>
-        <p:blipFill>
-          <a:blip r:embed="rId2"/>
-          <a:stretch>
-            <a:fillRect/>
-          </a:stretch>
-        </p:blipFill>
-        <p:spPr>
-          <a:xfrm>
-            <a:off x="1274492" y="1169988"/>
-            <a:ext cx="6438900" cy="5232400"/>
-          </a:xfrm>
-          <a:prstGeom prst="rect">
-            <a:avLst/>
-          </a:prstGeom>
-        </p:spPr>
-      </p:pic>
     </p:spTree>
     <p:extLst>
       <p:ext uri="{BB962C8B-B14F-4D97-AF65-F5344CB8AC3E}">
-        <p14:creationId xmlns:p14="http://schemas.microsoft.com/office/powerpoint/2010/main" val="2045826607"/>
+        <p14:creationId xmlns:p14="http://schemas.microsoft.com/office/powerpoint/2010/main" val="941804289"/>
       </p:ext>
     </p:extLst>
   </p:cSld>
@@ -5756,26 +5738,14 @@
             <p:ph type="title"/>
           </p:nvPr>
         </p:nvSpPr>
-        <p:spPr>
-          <a:xfrm>
-            <a:off x="546100" y="119167"/>
-            <a:ext cx="8329613" cy="911019"/>
-          </a:xfrm>
-        </p:spPr>
+        <p:spPr/>
         <p:txBody>
           <a:bodyPr/>
           <a:lstStyle/>
           <a:p>
             <a:r>
               <a:rPr lang="en-US" dirty="0"/>
-              <a:t>IL6 – From FDA CP Review – RA</a:t>
-            </a:r>
-            <a:br>
-              <a:rPr lang="en-US" dirty="0"/>
-            </a:br>
-            <a:r>
-              <a:rPr lang="en-US" dirty="0"/>
-              <a:t>Single Admin 10 mg/kg p18 PDF</a:t>
+              <a:t>From FDA CP Review - SJIA</a:t>
             </a:r>
           </a:p>
         </p:txBody>
@@ -5851,32 +5821,8 @@
         </p:blipFill>
         <p:spPr>
           <a:xfrm>
-            <a:off x="1753646" y="1030186"/>
-            <a:ext cx="4747515" cy="3371134"/>
-          </a:xfrm>
-          <a:prstGeom prst="rect">
-            <a:avLst/>
-          </a:prstGeom>
-        </p:spPr>
-      </p:pic>
-      <p:pic>
-        <p:nvPicPr>
-          <p:cNvPr id="7" name="Picture 6"/>
-          <p:cNvPicPr>
-            <a:picLocks noChangeAspect="1"/>
-          </p:cNvPicPr>
-          <p:nvPr/>
-        </p:nvPicPr>
-        <p:blipFill>
-          <a:blip r:embed="rId3"/>
-          <a:stretch>
-            <a:fillRect/>
-          </a:stretch>
-        </p:blipFill>
-        <p:spPr>
-          <a:xfrm>
-            <a:off x="738188" y="4075299"/>
-            <a:ext cx="5809785" cy="2323914"/>
+            <a:off x="1274492" y="1169988"/>
+            <a:ext cx="6438900" cy="5232400"/>
           </a:xfrm>
           <a:prstGeom prst="rect">
             <a:avLst/>
@@ -5886,7 +5832,7 @@
     </p:spTree>
     <p:extLst>
       <p:ext uri="{BB962C8B-B14F-4D97-AF65-F5344CB8AC3E}">
-        <p14:creationId xmlns:p14="http://schemas.microsoft.com/office/powerpoint/2010/main" val="333582338"/>
+        <p14:creationId xmlns:p14="http://schemas.microsoft.com/office/powerpoint/2010/main" val="2045826607"/>
       </p:ext>
     </p:extLst>
   </p:cSld>
@@ -5935,14 +5881,14 @@
           <a:p>
             <a:r>
               <a:rPr lang="en-US" dirty="0"/>
-              <a:t>Multiple Dose IL-6 from p17 FDA CP Review RA</a:t>
+              <a:t>IL6 – From FDA CP Review – RA</a:t>
             </a:r>
             <a:br>
               <a:rPr lang="en-US" dirty="0"/>
             </a:br>
             <a:r>
               <a:rPr lang="en-US" dirty="0"/>
-              <a:t>p39 PDF</a:t>
+              <a:t>Single Admin 10 mg/kg p18 PDF</a:t>
             </a:r>
           </a:p>
         </p:txBody>
@@ -6018,61 +5964,42 @@
         </p:blipFill>
         <p:spPr>
           <a:xfrm>
-            <a:off x="938213" y="1117746"/>
-            <a:ext cx="6729953" cy="5740254"/>
+            <a:off x="1753646" y="1030186"/>
+            <a:ext cx="4747515" cy="3371134"/>
           </a:xfrm>
           <a:prstGeom prst="rect">
             <a:avLst/>
           </a:prstGeom>
         </p:spPr>
       </p:pic>
-      <p:sp>
-        <p:nvSpPr>
-          <p:cNvPr id="8" name="TextBox 7"/>
-          <p:cNvSpPr txBox="1"/>
+      <p:pic>
+        <p:nvPicPr>
+          <p:cNvPr id="7" name="Picture 6"/>
+          <p:cNvPicPr>
+            <a:picLocks noChangeAspect="1"/>
+          </p:cNvPicPr>
           <p:nvPr/>
-        </p:nvSpPr>
-        <p:spPr>
-          <a:xfrm>
-            <a:off x="538163" y="5307981"/>
-            <a:ext cx="7654660" cy="646331"/>
+        </p:nvPicPr>
+        <p:blipFill>
+          <a:blip r:embed="rId3"/>
+          <a:stretch>
+            <a:fillRect/>
+          </a:stretch>
+        </p:blipFill>
+        <p:spPr>
+          <a:xfrm>
+            <a:off x="738188" y="4075299"/>
+            <a:ext cx="5809785" cy="2323914"/>
           </a:xfrm>
           <a:prstGeom prst="rect">
             <a:avLst/>
           </a:prstGeom>
-          <a:noFill/>
-        </p:spPr>
-        <p:txBody>
-          <a:bodyPr wrap="none" rtlCol="0">
-            <a:spAutoFit/>
-          </a:bodyPr>
-          <a:lstStyle/>
-          <a:p>
-            <a:r>
-              <a:rPr lang="en-US" b="1" dirty="0">
-                <a:solidFill>
-                  <a:srgbClr val="0070C0"/>
-                </a:solidFill>
-              </a:rPr>
-              <a:t>In between doses, 4, 8 are similar.  </a:t>
-            </a:r>
-          </a:p>
-          <a:p>
-            <a:r>
-              <a:rPr lang="en-US" b="1" dirty="0">
-                <a:solidFill>
-                  <a:srgbClr val="0070C0"/>
-                </a:solidFill>
-              </a:rPr>
-              <a:t>At trough when toci is nearly gone for 4 mg=kg, there is a difference</a:t>
-            </a:r>
-          </a:p>
-        </p:txBody>
-      </p:sp>
+        </p:spPr>
+      </p:pic>
     </p:spTree>
     <p:extLst>
       <p:ext uri="{BB962C8B-B14F-4D97-AF65-F5344CB8AC3E}">
-        <p14:creationId xmlns:p14="http://schemas.microsoft.com/office/powerpoint/2010/main" val="629593614"/>
+        <p14:creationId xmlns:p14="http://schemas.microsoft.com/office/powerpoint/2010/main" val="333582338"/>
       </p:ext>
     </p:extLst>
   </p:cSld>
@@ -6109,14 +6036,26 @@
             <p:ph type="title"/>
           </p:nvPr>
         </p:nvSpPr>
-        <p:spPr/>
+        <p:spPr>
+          <a:xfrm>
+            <a:off x="546100" y="119167"/>
+            <a:ext cx="8329613" cy="911019"/>
+          </a:xfrm>
+        </p:spPr>
         <p:txBody>
           <a:bodyPr/>
           <a:lstStyle/>
           <a:p>
             <a:r>
               <a:rPr lang="en-US" dirty="0"/>
-              <a:t>sIL6R – p41</a:t>
+              <a:t>Multiple Dose IL-6 from p17 FDA CP Review RA</a:t>
+            </a:r>
+            <a:br>
+              <a:rPr lang="en-US" dirty="0"/>
+            </a:br>
+            <a:r>
+              <a:rPr lang="en-US" dirty="0"/>
+              <a:t>p39 PDF</a:t>
             </a:r>
           </a:p>
         </p:txBody>
@@ -6192,18 +6131,61 @@
         </p:blipFill>
         <p:spPr>
           <a:xfrm>
-            <a:off x="738188" y="1445941"/>
-            <a:ext cx="7327900" cy="4724400"/>
+            <a:off x="938213" y="1117746"/>
+            <a:ext cx="6729953" cy="5740254"/>
           </a:xfrm>
           <a:prstGeom prst="rect">
             <a:avLst/>
           </a:prstGeom>
         </p:spPr>
       </p:pic>
+      <p:sp>
+        <p:nvSpPr>
+          <p:cNvPr id="8" name="TextBox 7"/>
+          <p:cNvSpPr txBox="1"/>
+          <p:nvPr/>
+        </p:nvSpPr>
+        <p:spPr>
+          <a:xfrm>
+            <a:off x="538163" y="5307981"/>
+            <a:ext cx="7654660" cy="646331"/>
+          </a:xfrm>
+          <a:prstGeom prst="rect">
+            <a:avLst/>
+          </a:prstGeom>
+          <a:noFill/>
+        </p:spPr>
+        <p:txBody>
+          <a:bodyPr wrap="none" rtlCol="0">
+            <a:spAutoFit/>
+          </a:bodyPr>
+          <a:lstStyle/>
+          <a:p>
+            <a:r>
+              <a:rPr lang="en-US" b="1" dirty="0">
+                <a:solidFill>
+                  <a:srgbClr val="0070C0"/>
+                </a:solidFill>
+              </a:rPr>
+              <a:t>In between doses, 4, 8 are similar.  </a:t>
+            </a:r>
+          </a:p>
+          <a:p>
+            <a:r>
+              <a:rPr lang="en-US" b="1" dirty="0">
+                <a:solidFill>
+                  <a:srgbClr val="0070C0"/>
+                </a:solidFill>
+              </a:rPr>
+              <a:t>At trough when toci is nearly gone for 4 mg=kg, there is a difference</a:t>
+            </a:r>
+          </a:p>
+        </p:txBody>
+      </p:sp>
     </p:spTree>
     <p:extLst>
       <p:ext uri="{BB962C8B-B14F-4D97-AF65-F5344CB8AC3E}">
-        <p14:creationId xmlns:p14="http://schemas.microsoft.com/office/powerpoint/2010/main" val="1988714904"/>
+        <p14:creationId xmlns:p14="http://schemas.microsoft.com/office/powerpoint/2010/main" val="629593614"/>
       </p:ext>
     </p:extLst>
   </p:cSld>
@@ -6247,7 +6229,7 @@
           <a:p>
             <a:r>
               <a:rPr lang="en-US" dirty="0"/>
-              <a:t>CRP – p18 FDA CP Review RA p41</a:t>
+              <a:t>sIL6R – p41</a:t>
             </a:r>
           </a:p>
         </p:txBody>
@@ -6323,6 +6305,137 @@
         </p:blipFill>
         <p:spPr>
           <a:xfrm>
+            <a:off x="738188" y="1445941"/>
+            <a:ext cx="7327900" cy="4724400"/>
+          </a:xfrm>
+          <a:prstGeom prst="rect">
+            <a:avLst/>
+          </a:prstGeom>
+        </p:spPr>
+      </p:pic>
+    </p:spTree>
+    <p:extLst>
+      <p:ext uri="{BB962C8B-B14F-4D97-AF65-F5344CB8AC3E}">
+        <p14:creationId xmlns:p14="http://schemas.microsoft.com/office/powerpoint/2010/main" val="1988714904"/>
+      </p:ext>
+    </p:extLst>
+  </p:cSld>
+  <p:clrMapOvr>
+    <a:masterClrMapping/>
+  </p:clrMapOvr>
+</p:sld>
+</file>
+
+<file path=ppt/slides/slide15.xml><?xml version="1.0" encoding="utf-8"?>
+<p:sld xmlns:a="http://schemas.openxmlformats.org/drawingml/2006/main" xmlns:r="http://schemas.openxmlformats.org/officeDocument/2006/relationships" xmlns:p="http://schemas.openxmlformats.org/presentationml/2006/main">
+  <p:cSld>
+    <p:spTree>
+      <p:nvGrpSpPr>
+        <p:cNvPr id="1" name=""/>
+        <p:cNvGrpSpPr/>
+        <p:nvPr/>
+      </p:nvGrpSpPr>
+      <p:grpSpPr>
+        <a:xfrm>
+          <a:off x="0" y="0"/>
+          <a:ext cx="0" cy="0"/>
+          <a:chOff x="0" y="0"/>
+          <a:chExt cx="0" cy="0"/>
+        </a:xfrm>
+      </p:grpSpPr>
+      <p:sp>
+        <p:nvSpPr>
+          <p:cNvPr id="2" name="Title 1"/>
+          <p:cNvSpPr>
+            <a:spLocks noGrp="1"/>
+          </p:cNvSpPr>
+          <p:nvPr>
+            <p:ph type="title"/>
+          </p:nvPr>
+        </p:nvSpPr>
+        <p:spPr/>
+        <p:txBody>
+          <a:bodyPr/>
+          <a:lstStyle/>
+          <a:p>
+            <a:r>
+              <a:rPr lang="en-US" dirty="0"/>
+              <a:t>CRP – p18 FDA CP Review RA p41</a:t>
+            </a:r>
+          </a:p>
+        </p:txBody>
+      </p:sp>
+      <p:sp>
+        <p:nvSpPr>
+          <p:cNvPr id="4" name="Footer Placeholder 3"/>
+          <p:cNvSpPr>
+            <a:spLocks noGrp="1"/>
+          </p:cNvSpPr>
+          <p:nvPr>
+            <p:ph type="ftr" sz="quarter" idx="10"/>
+          </p:nvPr>
+        </p:nvSpPr>
+        <p:spPr/>
+        <p:txBody>
+          <a:bodyPr/>
+          <a:lstStyle/>
+          <a:p>
+            <a:pPr>
+              <a:defRPr/>
+            </a:pPr>
+            <a:r>
+              <a:rPr lang="en-US"/>
+              <a:t>| MCP-Mod | A. Stein | Mar 2014 | Intuitive Intro | Business Use Only</a:t>
+            </a:r>
+            <a:endParaRPr lang="en-US" dirty="0"/>
+          </a:p>
+        </p:txBody>
+      </p:sp>
+      <p:sp>
+        <p:nvSpPr>
+          <p:cNvPr id="5" name="Slide Number Placeholder 4"/>
+          <p:cNvSpPr>
+            <a:spLocks noGrp="1"/>
+          </p:cNvSpPr>
+          <p:nvPr>
+            <p:ph type="sldNum" sz="quarter" idx="11"/>
+          </p:nvPr>
+        </p:nvSpPr>
+        <p:spPr/>
+        <p:txBody>
+          <a:bodyPr/>
+          <a:lstStyle/>
+          <a:p>
+            <a:pPr>
+              <a:defRPr/>
+            </a:pPr>
+            <a:fld id="{BC80046B-4035-DC43-AEB6-62192A2642F4}" type="slidenum">
+              <a:rPr lang="en-US" smtClean="0"/>
+              <a:pPr>
+                <a:defRPr/>
+              </a:pPr>
+              <a:t>15</a:t>
+            </a:fld>
+            <a:endParaRPr lang="en-US"/>
+          </a:p>
+        </p:txBody>
+      </p:sp>
+      <p:pic>
+        <p:nvPicPr>
+          <p:cNvPr id="6" name="Picture 5"/>
+          <p:cNvPicPr>
+            <a:picLocks noChangeAspect="1"/>
+          </p:cNvPicPr>
+          <p:nvPr/>
+        </p:nvPicPr>
+        <p:blipFill>
+          <a:blip r:embed="rId2"/>
+          <a:stretch>
+            <a:fillRect/>
+          </a:stretch>
+        </p:blipFill>
+        <p:spPr>
+          <a:xfrm>
             <a:off x="825191" y="1122471"/>
             <a:ext cx="6876832" cy="5735529"/>
           </a:xfrm>
@@ -6344,7 +6457,7 @@
 </p:sld>
 </file>
 
-<file path=ppt/slides/slide15.xml><?xml version="1.0" encoding="utf-8"?>
+<file path=ppt/slides/slide16.xml><?xml version="1.0" encoding="utf-8"?>
 <p:sld xmlns:a="http://schemas.openxmlformats.org/drawingml/2006/main" xmlns:r="http://schemas.openxmlformats.org/officeDocument/2006/relationships" xmlns:p="http://schemas.openxmlformats.org/presentationml/2006/main">
   <p:cSld>
     <p:spTree>
@@ -6517,7 +6630,7 @@
                 <a:latin typeface="Imago" charset="0"/>
               </a:rPr>
               <a:pPr/>
-              <a:t>15</a:t>
+              <a:t>16</a:t>
             </a:fld>
             <a:endParaRPr lang="en-US" altLang="en-US" sz="1600">
               <a:latin typeface="Imago" charset="0"/>
@@ -6573,7 +6686,7 @@
           <a:graphicData uri="http://schemas.openxmlformats.org/presentationml/2006/ole">
             <mc:AlternateContent xmlns:mc="http://schemas.openxmlformats.org/markup-compatibility/2006">
               <mc:Choice xmlns:v="urn:schemas-microsoft-com:vml" Requires="v">
-                <p:oleObj spid="_x0000_s1038" name="Document" r:id="rId4" imgW="5027587" imgH="3911148" progId="Word.Document.8">
+                <p:oleObj spid="_x0000_s1041" name="Document" r:id="rId4" imgW="5027587" imgH="3911148" progId="Word.Document.8">
                   <p:embed/>
                 </p:oleObj>
               </mc:Choice>
@@ -6663,7 +6776,7 @@
           <a:effectLst/>
           <a:extLst>
             <a:ext uri="{909E8E84-426E-40dd-AFC4-6F175D3DCCD1}">
-              <a14:hiddenFill xmlns:a14="http://schemas.microsoft.com/office/drawing/2010/main" xmlns="">
+              <a14:hiddenFill xmlns="" xmlns:a14="http://schemas.microsoft.com/office/drawing/2010/main">
                 <a:gradFill rotWithShape="1">
                   <a:gsLst>
                     <a:gs pos="0">
@@ -6678,7 +6791,7 @@
               </a14:hiddenFill>
             </a:ext>
             <a:ext uri="{91240B29-F687-4f45-9708-019B960494DF}">
-              <a14:hiddenLine xmlns:a14="http://schemas.microsoft.com/office/drawing/2010/main" xmlns="" w="9525">
+              <a14:hiddenLine xmlns="" xmlns:a14="http://schemas.microsoft.com/office/drawing/2010/main" w="9525">
                 <a:solidFill>
                   <a:schemeClr val="tx2"/>
                 </a:solidFill>
@@ -6688,7 +6801,7 @@
               </a14:hiddenLine>
             </a:ext>
             <a:ext uri="{AF507438-7753-43e0-B8FC-AC1667EBCBE1}">
-              <a14:hiddenEffects xmlns:a14="http://schemas.microsoft.com/office/drawing/2010/main" xmlns="">
+              <a14:hiddenEffects xmlns="" xmlns:a14="http://schemas.microsoft.com/office/drawing/2010/main">
                 <a:effectLst>
                   <a:outerShdw blurRad="63500" dist="38099" dir="2700000" algn="ctr" rotWithShape="0">
                     <a:schemeClr val="bg2">
@@ -9412,8 +9525,8 @@
           <a:lstStyle/>
           <a:p>
             <a:r>
-              <a:rPr lang="en-US"/>
-              <a:t>Model Details</a:t>
+              <a:rPr lang="en-US" dirty="0"/>
+              <a:t>Model Details – Model G</a:t>
             </a:r>
           </a:p>
         </p:txBody>
@@ -11039,7 +11152,13 @@
       </p:grpSpPr>
       <p:sp>
         <p:nvSpPr>
-          <p:cNvPr id="6" name="Title 5"/>
+          <p:cNvPr id="2" name="Title 1">
+            <a:extLst>
+              <a:ext uri="{FF2B5EF4-FFF2-40B4-BE49-F238E27FC236}">
+                <a16:creationId xmlns:a16="http://schemas.microsoft.com/office/drawing/2014/main" id="{99ED900E-FC29-714F-9A38-D9B255A8A07E}"/>
+              </a:ext>
+            </a:extLst>
+          </p:cNvPr>
           <p:cNvSpPr>
             <a:spLocks noGrp="1"/>
           </p:cNvSpPr>
@@ -11049,8 +11168,8 @@
         </p:nvSpPr>
         <p:spPr>
           <a:xfrm>
-            <a:off x="722313" y="2805995"/>
-            <a:ext cx="7772400" cy="1261884"/>
+            <a:off x="546100" y="322043"/>
+            <a:ext cx="8329613" cy="505266"/>
           </a:xfrm>
         </p:spPr>
         <p:txBody>
@@ -11059,40 +11178,20 @@
           <a:p>
             <a:r>
               <a:rPr lang="en-US" dirty="0"/>
-              <a:t>backups – additional data</a:t>
-            </a:r>
-          </a:p>
-        </p:txBody>
-      </p:sp>
-      <p:sp>
-        <p:nvSpPr>
-          <p:cNvPr id="4" name="Footer Placeholder 3"/>
-          <p:cNvSpPr>
-            <a:spLocks noGrp="1"/>
-          </p:cNvSpPr>
-          <p:nvPr>
-            <p:ph type="ftr" sz="quarter" idx="10"/>
-          </p:nvPr>
-        </p:nvSpPr>
-        <p:spPr/>
-        <p:txBody>
-          <a:bodyPr/>
-          <a:lstStyle/>
-          <a:p>
-            <a:pPr>
-              <a:defRPr/>
-            </a:pPr>
-            <a:r>
-              <a:rPr lang="en-US"/>
-              <a:t>| MCP-Mod | A. Stein | Mar 2014 | Intuitive Intro | Business Use Only</a:t>
-            </a:r>
-            <a:endParaRPr lang="en-US" dirty="0"/>
-          </a:p>
-        </p:txBody>
-      </p:sp>
-      <p:sp>
-        <p:nvSpPr>
-          <p:cNvPr id="5" name="Slide Number Placeholder 4"/>
+              <a:t>Model Details – Model H</a:t>
+            </a:r>
+          </a:p>
+        </p:txBody>
+      </p:sp>
+      <p:sp>
+        <p:nvSpPr>
+          <p:cNvPr id="5" name="Slide Number Placeholder 4">
+            <a:extLst>
+              <a:ext uri="{FF2B5EF4-FFF2-40B4-BE49-F238E27FC236}">
+                <a16:creationId xmlns:a16="http://schemas.microsoft.com/office/drawing/2014/main" id="{641A65B3-9B06-4440-8208-BF36FDEB43BC}"/>
+              </a:ext>
+            </a:extLst>
+          </p:cNvPr>
           <p:cNvSpPr>
             <a:spLocks noGrp="1"/>
           </p:cNvSpPr>
@@ -11119,10 +11218,2468 @@
           </a:p>
         </p:txBody>
       </p:sp>
+      <p:sp>
+        <p:nvSpPr>
+          <p:cNvPr id="7" name="TextBox 6">
+            <a:extLst>
+              <a:ext uri="{FF2B5EF4-FFF2-40B4-BE49-F238E27FC236}">
+                <a16:creationId xmlns:a16="http://schemas.microsoft.com/office/drawing/2014/main" id="{A7394AEE-2A10-6743-BEC3-1AFF7F8F928D}"/>
+              </a:ext>
+            </a:extLst>
+          </p:cNvPr>
+          <p:cNvSpPr txBox="1"/>
+          <p:nvPr/>
+        </p:nvSpPr>
+        <p:spPr>
+          <a:xfrm>
+            <a:off x="2031433" y="3358962"/>
+            <a:ext cx="684803" cy="646331"/>
+          </a:xfrm>
+          <a:prstGeom prst="rect">
+            <a:avLst/>
+          </a:prstGeom>
+          <a:solidFill>
+            <a:schemeClr val="bg2">
+              <a:lumMod val="85000"/>
+            </a:schemeClr>
+          </a:solidFill>
+          <a:ln>
+            <a:noFill/>
+          </a:ln>
+        </p:spPr>
+        <p:txBody>
+          <a:bodyPr wrap="none" rtlCol="0">
+            <a:spAutoFit/>
+          </a:bodyPr>
+          <a:lstStyle/>
+          <a:p>
+            <a:pPr algn="ctr"/>
+            <a:r>
+              <a:rPr lang="en-US" sz="1800" dirty="0"/>
+              <a:t>Drug</a:t>
+            </a:r>
+          </a:p>
+          <a:p>
+            <a:pPr algn="ctr"/>
+            <a:r>
+              <a:rPr lang="en-US" sz="1800" dirty="0"/>
+              <a:t>(D)</a:t>
+            </a:r>
+          </a:p>
+        </p:txBody>
+      </p:sp>
+      <p:sp>
+        <p:nvSpPr>
+          <p:cNvPr id="8" name="TextBox 7">
+            <a:extLst>
+              <a:ext uri="{FF2B5EF4-FFF2-40B4-BE49-F238E27FC236}">
+                <a16:creationId xmlns:a16="http://schemas.microsoft.com/office/drawing/2014/main" id="{9AE288BD-0E3E-1044-8E99-AC69919CF93A}"/>
+              </a:ext>
+            </a:extLst>
+          </p:cNvPr>
+          <p:cNvSpPr txBox="1"/>
+          <p:nvPr/>
+        </p:nvSpPr>
+        <p:spPr>
+          <a:xfrm>
+            <a:off x="2630441" y="5303641"/>
+            <a:ext cx="1095173" cy="646331"/>
+          </a:xfrm>
+          <a:prstGeom prst="rect">
+            <a:avLst/>
+          </a:prstGeom>
+          <a:solidFill>
+            <a:schemeClr val="bg2">
+              <a:lumMod val="85000"/>
+            </a:schemeClr>
+          </a:solidFill>
+          <a:ln>
+            <a:noFill/>
+          </a:ln>
+        </p:spPr>
+        <p:txBody>
+          <a:bodyPr wrap="none" rtlCol="0">
+            <a:spAutoFit/>
+          </a:bodyPr>
+          <a:lstStyle/>
+          <a:p>
+            <a:pPr algn="ctr"/>
+            <a:r>
+              <a:rPr lang="en-US" sz="1800" dirty="0"/>
+              <a:t>Complex</a:t>
+            </a:r>
+          </a:p>
+          <a:p>
+            <a:pPr algn="ctr"/>
+            <a:r>
+              <a:rPr lang="en-US" sz="1800" dirty="0"/>
+              <a:t>(DT)</a:t>
+            </a:r>
+          </a:p>
+        </p:txBody>
+      </p:sp>
+      <p:sp>
+        <p:nvSpPr>
+          <p:cNvPr id="9" name="TextBox 8">
+            <a:extLst>
+              <a:ext uri="{FF2B5EF4-FFF2-40B4-BE49-F238E27FC236}">
+                <a16:creationId xmlns:a16="http://schemas.microsoft.com/office/drawing/2014/main" id="{CD0CAE8C-1144-F748-8321-3259748FA2B2}"/>
+              </a:ext>
+            </a:extLst>
+          </p:cNvPr>
+          <p:cNvSpPr txBox="1"/>
+          <p:nvPr/>
+        </p:nvSpPr>
+        <p:spPr>
+          <a:xfrm>
+            <a:off x="5606536" y="3396986"/>
+            <a:ext cx="877163" cy="646331"/>
+          </a:xfrm>
+          <a:prstGeom prst="rect">
+            <a:avLst/>
+          </a:prstGeom>
+          <a:solidFill>
+            <a:schemeClr val="bg2">
+              <a:lumMod val="85000"/>
+            </a:schemeClr>
+          </a:solidFill>
+          <a:ln>
+            <a:noFill/>
+          </a:ln>
+        </p:spPr>
+        <p:txBody>
+          <a:bodyPr wrap="none" rtlCol="0">
+            <a:spAutoFit/>
+          </a:bodyPr>
+          <a:lstStyle/>
+          <a:p>
+            <a:pPr algn="ctr"/>
+            <a:r>
+              <a:rPr lang="en-US" sz="1800" dirty="0"/>
+              <a:t>Ligand</a:t>
+            </a:r>
+          </a:p>
+          <a:p>
+            <a:pPr algn="ctr"/>
+            <a:r>
+              <a:rPr lang="en-US" dirty="0"/>
+              <a:t>(L)</a:t>
+            </a:r>
+            <a:endParaRPr lang="en-US" sz="1800" dirty="0"/>
+          </a:p>
+        </p:txBody>
+      </p:sp>
+      <p:sp>
+        <p:nvSpPr>
+          <p:cNvPr id="10" name="TextBox 9">
+            <a:extLst>
+              <a:ext uri="{FF2B5EF4-FFF2-40B4-BE49-F238E27FC236}">
+                <a16:creationId xmlns:a16="http://schemas.microsoft.com/office/drawing/2014/main" id="{4FB4A222-4B5C-2646-A610-3C479D788CFC}"/>
+              </a:ext>
+            </a:extLst>
+          </p:cNvPr>
+          <p:cNvSpPr txBox="1"/>
+          <p:nvPr/>
+        </p:nvSpPr>
+        <p:spPr>
+          <a:xfrm>
+            <a:off x="2914512" y="3626645"/>
+            <a:ext cx="484227" cy="707886"/>
+          </a:xfrm>
+          <a:prstGeom prst="rect">
+            <a:avLst/>
+          </a:prstGeom>
+          <a:noFill/>
+        </p:spPr>
+        <p:txBody>
+          <a:bodyPr wrap="none" rtlCol="0">
+            <a:spAutoFit/>
+          </a:bodyPr>
+          <a:lstStyle/>
+          <a:p>
+            <a:r>
+              <a:rPr lang="en-US" sz="4000" dirty="0"/>
+              <a:t>+</a:t>
+            </a:r>
+          </a:p>
+        </p:txBody>
+      </p:sp>
+      <p:sp>
+        <p:nvSpPr>
+          <p:cNvPr id="11" name="TextBox 10">
+            <a:extLst>
+              <a:ext uri="{FF2B5EF4-FFF2-40B4-BE49-F238E27FC236}">
+                <a16:creationId xmlns:a16="http://schemas.microsoft.com/office/drawing/2014/main" id="{787DB834-1A2F-404B-96E9-0A23023E2921}"/>
+              </a:ext>
+            </a:extLst>
+          </p:cNvPr>
+          <p:cNvSpPr txBox="1"/>
+          <p:nvPr/>
+        </p:nvSpPr>
+        <p:spPr>
+          <a:xfrm>
+            <a:off x="5073741" y="3666717"/>
+            <a:ext cx="484227" cy="707886"/>
+          </a:xfrm>
+          <a:prstGeom prst="rect">
+            <a:avLst/>
+          </a:prstGeom>
+          <a:noFill/>
+        </p:spPr>
+        <p:txBody>
+          <a:bodyPr wrap="none" rtlCol="0">
+            <a:spAutoFit/>
+          </a:bodyPr>
+          <a:lstStyle/>
+          <a:p>
+            <a:r>
+              <a:rPr lang="en-US" sz="4000" dirty="0"/>
+              <a:t>+</a:t>
+            </a:r>
+          </a:p>
+        </p:txBody>
+      </p:sp>
+      <p:sp>
+        <p:nvSpPr>
+          <p:cNvPr id="12" name="TextBox 11">
+            <a:extLst>
+              <a:ext uri="{FF2B5EF4-FFF2-40B4-BE49-F238E27FC236}">
+                <a16:creationId xmlns:a16="http://schemas.microsoft.com/office/drawing/2014/main" id="{EE4BA85D-6520-9C45-BF86-2B0A13FAD526}"/>
+              </a:ext>
+            </a:extLst>
+          </p:cNvPr>
+          <p:cNvSpPr txBox="1"/>
+          <p:nvPr/>
+        </p:nvSpPr>
+        <p:spPr>
+          <a:xfrm>
+            <a:off x="4773322" y="5303641"/>
+            <a:ext cx="1095172" cy="646331"/>
+          </a:xfrm>
+          <a:prstGeom prst="rect">
+            <a:avLst/>
+          </a:prstGeom>
+          <a:solidFill>
+            <a:schemeClr val="bg2">
+              <a:lumMod val="85000"/>
+            </a:schemeClr>
+          </a:solidFill>
+          <a:ln>
+            <a:noFill/>
+          </a:ln>
+        </p:spPr>
+        <p:txBody>
+          <a:bodyPr wrap="none" rtlCol="0">
+            <a:spAutoFit/>
+          </a:bodyPr>
+          <a:lstStyle/>
+          <a:p>
+            <a:pPr algn="ctr"/>
+            <a:r>
+              <a:rPr lang="en-US" sz="1800" dirty="0"/>
+              <a:t>Complex</a:t>
+            </a:r>
+          </a:p>
+          <a:p>
+            <a:pPr algn="ctr"/>
+            <a:r>
+              <a:rPr lang="en-US" sz="1800" dirty="0"/>
+              <a:t>(TL)</a:t>
+            </a:r>
+          </a:p>
+        </p:txBody>
+      </p:sp>
+      <p:sp>
+        <p:nvSpPr>
+          <p:cNvPr id="14" name="TextBox 13">
+            <a:extLst>
+              <a:ext uri="{FF2B5EF4-FFF2-40B4-BE49-F238E27FC236}">
+                <a16:creationId xmlns:a16="http://schemas.microsoft.com/office/drawing/2014/main" id="{B7244F9C-75AA-CB44-805B-A7394A924D32}"/>
+              </a:ext>
+            </a:extLst>
+          </p:cNvPr>
+          <p:cNvSpPr txBox="1"/>
+          <p:nvPr/>
+        </p:nvSpPr>
+        <p:spPr>
+          <a:xfrm>
+            <a:off x="155366" y="3366209"/>
+            <a:ext cx="915635" cy="646331"/>
+          </a:xfrm>
+          <a:prstGeom prst="rect">
+            <a:avLst/>
+          </a:prstGeom>
+          <a:solidFill>
+            <a:schemeClr val="bg2">
+              <a:lumMod val="85000"/>
+            </a:schemeClr>
+          </a:solidFill>
+          <a:ln>
+            <a:noFill/>
+          </a:ln>
+        </p:spPr>
+        <p:txBody>
+          <a:bodyPr wrap="none" rtlCol="0">
+            <a:spAutoFit/>
+          </a:bodyPr>
+          <a:lstStyle/>
+          <a:p>
+            <a:pPr algn="ctr"/>
+            <a:r>
+              <a:rPr lang="en-US" sz="1800" dirty="0"/>
+              <a:t>Drug</a:t>
+            </a:r>
+          </a:p>
+          <a:p>
+            <a:pPr algn="ctr"/>
+            <a:r>
+              <a:rPr lang="en-US" dirty="0" err="1"/>
+              <a:t>P</a:t>
+            </a:r>
+            <a:r>
+              <a:rPr lang="en-US" sz="1800" dirty="0" err="1"/>
+              <a:t>eriph</a:t>
+            </a:r>
+            <a:r>
+              <a:rPr lang="en-US" sz="1800" dirty="0"/>
+              <a:t>.</a:t>
+            </a:r>
+          </a:p>
+        </p:txBody>
+      </p:sp>
+      <p:cxnSp>
+        <p:nvCxnSpPr>
+          <p:cNvPr id="16" name="Straight Arrow Connector 15">
+            <a:extLst>
+              <a:ext uri="{FF2B5EF4-FFF2-40B4-BE49-F238E27FC236}">
+                <a16:creationId xmlns:a16="http://schemas.microsoft.com/office/drawing/2014/main" id="{8A525396-A806-1545-BAE7-9FEE265259D5}"/>
+              </a:ext>
+            </a:extLst>
+          </p:cNvPr>
+          <p:cNvCxnSpPr/>
+          <p:nvPr/>
+        </p:nvCxnSpPr>
+        <p:spPr>
+          <a:xfrm>
+            <a:off x="6024960" y="3022749"/>
+            <a:ext cx="0" cy="374237"/>
+          </a:xfrm>
+          <a:prstGeom prst="straightConnector1">
+            <a:avLst/>
+          </a:prstGeom>
+          <a:ln>
+            <a:solidFill>
+              <a:schemeClr val="tx1"/>
+            </a:solidFill>
+            <a:tailEnd type="arrow"/>
+          </a:ln>
+          <a:effectLst/>
+        </p:spPr>
+        <p:style>
+          <a:lnRef idx="2">
+            <a:schemeClr val="accent1"/>
+          </a:lnRef>
+          <a:fillRef idx="0">
+            <a:schemeClr val="accent1"/>
+          </a:fillRef>
+          <a:effectRef idx="1">
+            <a:schemeClr val="accent1"/>
+          </a:effectRef>
+          <a:fontRef idx="minor">
+            <a:schemeClr val="tx1"/>
+          </a:fontRef>
+        </p:style>
+      </p:cxnSp>
+      <p:cxnSp>
+        <p:nvCxnSpPr>
+          <p:cNvPr id="17" name="Straight Arrow Connector 16">
+            <a:extLst>
+              <a:ext uri="{FF2B5EF4-FFF2-40B4-BE49-F238E27FC236}">
+                <a16:creationId xmlns:a16="http://schemas.microsoft.com/office/drawing/2014/main" id="{F524F1D5-93B8-4140-9547-92D55AD8AB49}"/>
+              </a:ext>
+            </a:extLst>
+          </p:cNvPr>
+          <p:cNvCxnSpPr/>
+          <p:nvPr/>
+        </p:nvCxnSpPr>
+        <p:spPr>
+          <a:xfrm>
+            <a:off x="3178026" y="5973916"/>
+            <a:ext cx="0" cy="290677"/>
+          </a:xfrm>
+          <a:prstGeom prst="straightConnector1">
+            <a:avLst/>
+          </a:prstGeom>
+          <a:ln>
+            <a:solidFill>
+              <a:schemeClr val="tx1"/>
+            </a:solidFill>
+            <a:tailEnd type="arrow"/>
+          </a:ln>
+          <a:effectLst/>
+        </p:spPr>
+        <p:style>
+          <a:lnRef idx="2">
+            <a:schemeClr val="accent1"/>
+          </a:lnRef>
+          <a:fillRef idx="0">
+            <a:schemeClr val="accent1"/>
+          </a:fillRef>
+          <a:effectRef idx="1">
+            <a:schemeClr val="accent1"/>
+          </a:effectRef>
+          <a:fontRef idx="minor">
+            <a:schemeClr val="tx1"/>
+          </a:fontRef>
+        </p:style>
+      </p:cxnSp>
+      <p:cxnSp>
+        <p:nvCxnSpPr>
+          <p:cNvPr id="20" name="Straight Arrow Connector 19">
+            <a:extLst>
+              <a:ext uri="{FF2B5EF4-FFF2-40B4-BE49-F238E27FC236}">
+                <a16:creationId xmlns:a16="http://schemas.microsoft.com/office/drawing/2014/main" id="{FFAD2561-3FEC-B34E-A2FC-14EEC17B3C19}"/>
+              </a:ext>
+            </a:extLst>
+          </p:cNvPr>
+          <p:cNvCxnSpPr/>
+          <p:nvPr/>
+        </p:nvCxnSpPr>
+        <p:spPr>
+          <a:xfrm>
+            <a:off x="5341895" y="5973916"/>
+            <a:ext cx="0" cy="290677"/>
+          </a:xfrm>
+          <a:prstGeom prst="straightConnector1">
+            <a:avLst/>
+          </a:prstGeom>
+          <a:ln>
+            <a:solidFill>
+              <a:schemeClr val="tx1"/>
+            </a:solidFill>
+            <a:tailEnd type="arrow"/>
+          </a:ln>
+          <a:effectLst/>
+        </p:spPr>
+        <p:style>
+          <a:lnRef idx="2">
+            <a:schemeClr val="accent1"/>
+          </a:lnRef>
+          <a:fillRef idx="0">
+            <a:schemeClr val="accent1"/>
+          </a:fillRef>
+          <a:effectRef idx="1">
+            <a:schemeClr val="accent1"/>
+          </a:effectRef>
+          <a:fontRef idx="minor">
+            <a:schemeClr val="tx1"/>
+          </a:fontRef>
+        </p:style>
+      </p:cxnSp>
+      <p:sp>
+        <p:nvSpPr>
+          <p:cNvPr id="22" name="TextBox 21">
+            <a:extLst>
+              <a:ext uri="{FF2B5EF4-FFF2-40B4-BE49-F238E27FC236}">
+                <a16:creationId xmlns:a16="http://schemas.microsoft.com/office/drawing/2014/main" id="{7FB0B660-1BBF-4746-BDB7-94D1818B4C55}"/>
+              </a:ext>
+            </a:extLst>
+          </p:cNvPr>
+          <p:cNvSpPr txBox="1"/>
+          <p:nvPr/>
+        </p:nvSpPr>
+        <p:spPr>
+          <a:xfrm>
+            <a:off x="3555872" y="3888080"/>
+            <a:ext cx="1442290" cy="646331"/>
+          </a:xfrm>
+          <a:prstGeom prst="rect">
+            <a:avLst/>
+          </a:prstGeom>
+          <a:solidFill>
+            <a:schemeClr val="bg2">
+              <a:lumMod val="85000"/>
+            </a:schemeClr>
+          </a:solidFill>
+          <a:ln>
+            <a:noFill/>
+          </a:ln>
+        </p:spPr>
+        <p:txBody>
+          <a:bodyPr wrap="square" rtlCol="0">
+            <a:spAutoFit/>
+          </a:bodyPr>
+          <a:lstStyle/>
+          <a:p>
+            <a:pPr algn="ctr"/>
+            <a:r>
+              <a:rPr lang="en-US" sz="1800" dirty="0"/>
+              <a:t>Sol Target</a:t>
+            </a:r>
+          </a:p>
+          <a:p>
+            <a:pPr algn="ctr"/>
+            <a:r>
+              <a:rPr lang="en-US" dirty="0"/>
+              <a:t>(T)</a:t>
+            </a:r>
+            <a:endParaRPr lang="en-US" sz="1800" dirty="0"/>
+          </a:p>
+        </p:txBody>
+      </p:sp>
+      <p:sp>
+        <p:nvSpPr>
+          <p:cNvPr id="23" name="Explosion 2 22">
+            <a:extLst>
+              <a:ext uri="{FF2B5EF4-FFF2-40B4-BE49-F238E27FC236}">
+                <a16:creationId xmlns:a16="http://schemas.microsoft.com/office/drawing/2014/main" id="{70E62D75-6AE2-1745-A040-6ECF717EAEC5}"/>
+              </a:ext>
+            </a:extLst>
+          </p:cNvPr>
+          <p:cNvSpPr/>
+          <p:nvPr/>
+        </p:nvSpPr>
+        <p:spPr>
+          <a:xfrm>
+            <a:off x="5948040" y="5031888"/>
+            <a:ext cx="1259995" cy="927159"/>
+          </a:xfrm>
+          <a:prstGeom prst="irregularSeal2">
+            <a:avLst/>
+          </a:prstGeom>
+          <a:solidFill>
+            <a:schemeClr val="accent1">
+              <a:lumMod val="20000"/>
+              <a:lumOff val="80000"/>
+            </a:schemeClr>
+          </a:solidFill>
+          <a:ln w="3175">
+            <a:solidFill>
+              <a:schemeClr val="tx1"/>
+            </a:solidFill>
+          </a:ln>
+          <a:effectLst/>
+        </p:spPr>
+        <p:style>
+          <a:lnRef idx="2">
+            <a:schemeClr val="accent1"/>
+          </a:lnRef>
+          <a:fillRef idx="0">
+            <a:schemeClr val="accent1"/>
+          </a:fillRef>
+          <a:effectRef idx="1">
+            <a:schemeClr val="accent1"/>
+          </a:effectRef>
+          <a:fontRef idx="minor">
+            <a:schemeClr val="tx1"/>
+          </a:fontRef>
+        </p:style>
+        <p:txBody>
+          <a:bodyPr lIns="0" tIns="0" rIns="0" bIns="0" rtlCol="0" anchor="ctr"/>
+          <a:lstStyle/>
+          <a:p>
+            <a:pPr algn="ctr"/>
+            <a:r>
+              <a:rPr lang="en-US" sz="1400" dirty="0"/>
+              <a:t>Signal</a:t>
+            </a:r>
+          </a:p>
+        </p:txBody>
+      </p:sp>
+      <p:cxnSp>
+        <p:nvCxnSpPr>
+          <p:cNvPr id="25" name="Straight Arrow Connector 24">
+            <a:extLst>
+              <a:ext uri="{FF2B5EF4-FFF2-40B4-BE49-F238E27FC236}">
+                <a16:creationId xmlns:a16="http://schemas.microsoft.com/office/drawing/2014/main" id="{BF67A7E6-077A-FD42-876F-8A3D1FF535BF}"/>
+              </a:ext>
+            </a:extLst>
+          </p:cNvPr>
+          <p:cNvCxnSpPr>
+            <a:cxnSpLocks/>
+          </p:cNvCxnSpPr>
+          <p:nvPr/>
+        </p:nvCxnSpPr>
+        <p:spPr>
+          <a:xfrm>
+            <a:off x="3780184" y="3682127"/>
+            <a:ext cx="0" cy="225142"/>
+          </a:xfrm>
+          <a:prstGeom prst="straightConnector1">
+            <a:avLst/>
+          </a:prstGeom>
+          <a:ln>
+            <a:solidFill>
+              <a:schemeClr val="tx1"/>
+            </a:solidFill>
+            <a:tailEnd type="arrow"/>
+          </a:ln>
+          <a:effectLst/>
+        </p:spPr>
+        <p:style>
+          <a:lnRef idx="2">
+            <a:schemeClr val="accent1"/>
+          </a:lnRef>
+          <a:fillRef idx="0">
+            <a:schemeClr val="accent1"/>
+          </a:fillRef>
+          <a:effectRef idx="1">
+            <a:schemeClr val="accent1"/>
+          </a:effectRef>
+          <a:fontRef idx="minor">
+            <a:schemeClr val="tx1"/>
+          </a:fontRef>
+        </p:style>
+      </p:cxnSp>
+      <p:cxnSp>
+        <p:nvCxnSpPr>
+          <p:cNvPr id="27" name="Straight Arrow Connector 26">
+            <a:extLst>
+              <a:ext uri="{FF2B5EF4-FFF2-40B4-BE49-F238E27FC236}">
+                <a16:creationId xmlns:a16="http://schemas.microsoft.com/office/drawing/2014/main" id="{68D5AD81-4092-B843-951F-D07AF292039B}"/>
+              </a:ext>
+            </a:extLst>
+          </p:cNvPr>
+          <p:cNvCxnSpPr/>
+          <p:nvPr/>
+        </p:nvCxnSpPr>
+        <p:spPr>
+          <a:xfrm>
+            <a:off x="4255595" y="4548910"/>
+            <a:ext cx="0" cy="374237"/>
+          </a:xfrm>
+          <a:prstGeom prst="straightConnector1">
+            <a:avLst/>
+          </a:prstGeom>
+          <a:ln>
+            <a:solidFill>
+              <a:schemeClr val="tx1"/>
+            </a:solidFill>
+            <a:tailEnd type="arrow"/>
+          </a:ln>
+          <a:effectLst/>
+        </p:spPr>
+        <p:style>
+          <a:lnRef idx="2">
+            <a:schemeClr val="accent1"/>
+          </a:lnRef>
+          <a:fillRef idx="0">
+            <a:schemeClr val="accent1"/>
+          </a:fillRef>
+          <a:effectRef idx="1">
+            <a:schemeClr val="accent1"/>
+          </a:effectRef>
+          <a:fontRef idx="minor">
+            <a:schemeClr val="tx1"/>
+          </a:fontRef>
+        </p:style>
+      </p:cxnSp>
+      <p:sp>
+        <p:nvSpPr>
+          <p:cNvPr id="31" name="TextBox 30">
+            <a:extLst>
+              <a:ext uri="{FF2B5EF4-FFF2-40B4-BE49-F238E27FC236}">
+                <a16:creationId xmlns:a16="http://schemas.microsoft.com/office/drawing/2014/main" id="{E3D2C345-D44B-C045-BBC7-C43241AED214}"/>
+              </a:ext>
+            </a:extLst>
+          </p:cNvPr>
+          <p:cNvSpPr txBox="1"/>
+          <p:nvPr/>
+        </p:nvSpPr>
+        <p:spPr>
+          <a:xfrm>
+            <a:off x="2549334" y="4642201"/>
+            <a:ext cx="1230850" cy="246221"/>
+          </a:xfrm>
+          <a:prstGeom prst="rect">
+            <a:avLst/>
+          </a:prstGeom>
+          <a:noFill/>
+        </p:spPr>
+        <p:txBody>
+          <a:bodyPr wrap="square" lIns="0" tIns="0" rIns="0" bIns="0" rtlCol="0">
+            <a:spAutoFit/>
+          </a:bodyPr>
+          <a:lstStyle/>
+          <a:p>
+            <a:pPr algn="ctr"/>
+            <a:r>
+              <a:rPr lang="en-US" sz="1600" dirty="0"/>
+              <a:t>k</a:t>
+            </a:r>
+            <a:r>
+              <a:rPr lang="en-US" sz="1600" baseline="-25000" dirty="0"/>
+              <a:t>onDT      </a:t>
+            </a:r>
+            <a:r>
+              <a:rPr lang="en-US" sz="1600" dirty="0"/>
+              <a:t>k</a:t>
+            </a:r>
+            <a:r>
+              <a:rPr lang="en-US" sz="1600" baseline="-25000" dirty="0"/>
+              <a:t>offDT</a:t>
+            </a:r>
+          </a:p>
+        </p:txBody>
+      </p:sp>
+      <p:sp>
+        <p:nvSpPr>
+          <p:cNvPr id="32" name="TextBox 31">
+            <a:extLst>
+              <a:ext uri="{FF2B5EF4-FFF2-40B4-BE49-F238E27FC236}">
+                <a16:creationId xmlns:a16="http://schemas.microsoft.com/office/drawing/2014/main" id="{729E976D-4620-5347-BEDF-6B2359FA94BD}"/>
+              </a:ext>
+            </a:extLst>
+          </p:cNvPr>
+          <p:cNvSpPr txBox="1"/>
+          <p:nvPr/>
+        </p:nvSpPr>
+        <p:spPr>
+          <a:xfrm>
+            <a:off x="3824411" y="3579808"/>
+            <a:ext cx="657532" cy="246221"/>
+          </a:xfrm>
+          <a:prstGeom prst="rect">
+            <a:avLst/>
+          </a:prstGeom>
+          <a:noFill/>
+        </p:spPr>
+        <p:txBody>
+          <a:bodyPr wrap="square" lIns="0" tIns="0" rIns="0" bIns="0" rtlCol="0">
+            <a:spAutoFit/>
+          </a:bodyPr>
+          <a:lstStyle/>
+          <a:p>
+            <a:r>
+              <a:rPr lang="en-US" sz="1600" dirty="0"/>
+              <a:t>k</a:t>
+            </a:r>
+            <a:r>
+              <a:rPr lang="en-US" sz="1600" baseline="-25000" dirty="0"/>
+              <a:t>synT</a:t>
+            </a:r>
+          </a:p>
+        </p:txBody>
+      </p:sp>
+      <p:sp>
+        <p:nvSpPr>
+          <p:cNvPr id="38" name="TextBox 37">
+            <a:extLst>
+              <a:ext uri="{FF2B5EF4-FFF2-40B4-BE49-F238E27FC236}">
+                <a16:creationId xmlns:a16="http://schemas.microsoft.com/office/drawing/2014/main" id="{BFDCDC8F-4A75-0548-8736-1A4FC92E6F2E}"/>
+              </a:ext>
+            </a:extLst>
+          </p:cNvPr>
+          <p:cNvSpPr txBox="1"/>
+          <p:nvPr/>
+        </p:nvSpPr>
+        <p:spPr>
+          <a:xfrm>
+            <a:off x="6122097" y="3021917"/>
+            <a:ext cx="657532" cy="246221"/>
+          </a:xfrm>
+          <a:prstGeom prst="rect">
+            <a:avLst/>
+          </a:prstGeom>
+          <a:noFill/>
+        </p:spPr>
+        <p:txBody>
+          <a:bodyPr wrap="square" lIns="0" tIns="0" rIns="0" bIns="0" rtlCol="0">
+            <a:spAutoFit/>
+          </a:bodyPr>
+          <a:lstStyle/>
+          <a:p>
+            <a:r>
+              <a:rPr lang="en-US" sz="1600" dirty="0"/>
+              <a:t>k</a:t>
+            </a:r>
+            <a:r>
+              <a:rPr lang="en-US" sz="1600" baseline="-25000" dirty="0"/>
+              <a:t>synL</a:t>
+            </a:r>
+          </a:p>
+        </p:txBody>
+      </p:sp>
+      <p:sp>
+        <p:nvSpPr>
+          <p:cNvPr id="39" name="TextBox 38">
+            <a:extLst>
+              <a:ext uri="{FF2B5EF4-FFF2-40B4-BE49-F238E27FC236}">
+                <a16:creationId xmlns:a16="http://schemas.microsoft.com/office/drawing/2014/main" id="{410338D7-6DF5-354A-B8A3-8BDF4196FE37}"/>
+              </a:ext>
+            </a:extLst>
+          </p:cNvPr>
+          <p:cNvSpPr txBox="1"/>
+          <p:nvPr/>
+        </p:nvSpPr>
+        <p:spPr>
+          <a:xfrm>
+            <a:off x="6122097" y="4040489"/>
+            <a:ext cx="657532" cy="246221"/>
+          </a:xfrm>
+          <a:prstGeom prst="rect">
+            <a:avLst/>
+          </a:prstGeom>
+          <a:noFill/>
+        </p:spPr>
+        <p:txBody>
+          <a:bodyPr wrap="square" lIns="0" tIns="0" rIns="0" bIns="0" rtlCol="0">
+            <a:spAutoFit/>
+          </a:bodyPr>
+          <a:lstStyle/>
+          <a:p>
+            <a:r>
+              <a:rPr lang="en-US" sz="1600" dirty="0"/>
+              <a:t>k</a:t>
+            </a:r>
+            <a:r>
+              <a:rPr lang="en-US" sz="1600" baseline="-25000" dirty="0"/>
+              <a:t>eL</a:t>
+            </a:r>
+          </a:p>
+        </p:txBody>
+      </p:sp>
+      <p:sp>
+        <p:nvSpPr>
+          <p:cNvPr id="40" name="TextBox 39">
+            <a:extLst>
+              <a:ext uri="{FF2B5EF4-FFF2-40B4-BE49-F238E27FC236}">
+                <a16:creationId xmlns:a16="http://schemas.microsoft.com/office/drawing/2014/main" id="{EB514F05-7B8D-F54E-A24D-6584007BB9EC}"/>
+              </a:ext>
+            </a:extLst>
+          </p:cNvPr>
+          <p:cNvSpPr txBox="1"/>
+          <p:nvPr/>
+        </p:nvSpPr>
+        <p:spPr>
+          <a:xfrm>
+            <a:off x="4339599" y="4539034"/>
+            <a:ext cx="657532" cy="246221"/>
+          </a:xfrm>
+          <a:prstGeom prst="rect">
+            <a:avLst/>
+          </a:prstGeom>
+          <a:noFill/>
+        </p:spPr>
+        <p:txBody>
+          <a:bodyPr wrap="square" lIns="0" tIns="0" rIns="0" bIns="0" rtlCol="0">
+            <a:spAutoFit/>
+          </a:bodyPr>
+          <a:lstStyle/>
+          <a:p>
+            <a:r>
+              <a:rPr lang="en-US" sz="1600" dirty="0"/>
+              <a:t>k</a:t>
+            </a:r>
+            <a:r>
+              <a:rPr lang="en-US" sz="1600" baseline="-25000" dirty="0"/>
+              <a:t>eT</a:t>
+            </a:r>
+          </a:p>
+        </p:txBody>
+      </p:sp>
+      <p:sp>
+        <p:nvSpPr>
+          <p:cNvPr id="41" name="TextBox 40">
+            <a:extLst>
+              <a:ext uri="{FF2B5EF4-FFF2-40B4-BE49-F238E27FC236}">
+                <a16:creationId xmlns:a16="http://schemas.microsoft.com/office/drawing/2014/main" id="{67C17986-BBF9-434E-9E0B-195893794331}"/>
+              </a:ext>
+            </a:extLst>
+          </p:cNvPr>
+          <p:cNvSpPr txBox="1"/>
+          <p:nvPr/>
+        </p:nvSpPr>
+        <p:spPr>
+          <a:xfrm>
+            <a:off x="3272109" y="6009019"/>
+            <a:ext cx="657532" cy="246221"/>
+          </a:xfrm>
+          <a:prstGeom prst="rect">
+            <a:avLst/>
+          </a:prstGeom>
+          <a:noFill/>
+        </p:spPr>
+        <p:txBody>
+          <a:bodyPr wrap="square" lIns="0" tIns="0" rIns="0" bIns="0" rtlCol="0">
+            <a:spAutoFit/>
+          </a:bodyPr>
+          <a:lstStyle/>
+          <a:p>
+            <a:r>
+              <a:rPr lang="en-US" sz="1600" dirty="0"/>
+              <a:t>k</a:t>
+            </a:r>
+            <a:r>
+              <a:rPr lang="en-US" sz="1600" baseline="-25000" dirty="0"/>
+              <a:t>eDT</a:t>
+            </a:r>
+          </a:p>
+        </p:txBody>
+      </p:sp>
+      <p:sp>
+        <p:nvSpPr>
+          <p:cNvPr id="42" name="TextBox 41">
+            <a:extLst>
+              <a:ext uri="{FF2B5EF4-FFF2-40B4-BE49-F238E27FC236}">
+                <a16:creationId xmlns:a16="http://schemas.microsoft.com/office/drawing/2014/main" id="{6CAF024A-0A8E-8843-B9EE-7ECA44B5DE54}"/>
+              </a:ext>
+            </a:extLst>
+          </p:cNvPr>
+          <p:cNvSpPr txBox="1"/>
+          <p:nvPr/>
+        </p:nvSpPr>
+        <p:spPr>
+          <a:xfrm>
+            <a:off x="5462346" y="6009019"/>
+            <a:ext cx="657532" cy="246221"/>
+          </a:xfrm>
+          <a:prstGeom prst="rect">
+            <a:avLst/>
+          </a:prstGeom>
+          <a:noFill/>
+        </p:spPr>
+        <p:txBody>
+          <a:bodyPr wrap="square" lIns="0" tIns="0" rIns="0" bIns="0" rtlCol="0">
+            <a:spAutoFit/>
+          </a:bodyPr>
+          <a:lstStyle/>
+          <a:p>
+            <a:r>
+              <a:rPr lang="en-US" sz="1600" dirty="0"/>
+              <a:t>k</a:t>
+            </a:r>
+            <a:r>
+              <a:rPr lang="en-US" sz="1600" baseline="-25000" dirty="0"/>
+              <a:t>eTL</a:t>
+            </a:r>
+          </a:p>
+        </p:txBody>
+      </p:sp>
+      <p:sp>
+        <p:nvSpPr>
+          <p:cNvPr id="43" name="TextBox 42">
+            <a:extLst>
+              <a:ext uri="{FF2B5EF4-FFF2-40B4-BE49-F238E27FC236}">
+                <a16:creationId xmlns:a16="http://schemas.microsoft.com/office/drawing/2014/main" id="{0D35CF90-8E71-5D42-ADB8-E6F4EC51F030}"/>
+              </a:ext>
+            </a:extLst>
+          </p:cNvPr>
+          <p:cNvSpPr txBox="1"/>
+          <p:nvPr/>
+        </p:nvSpPr>
+        <p:spPr>
+          <a:xfrm>
+            <a:off x="4717190" y="4642201"/>
+            <a:ext cx="1230850" cy="246221"/>
+          </a:xfrm>
+          <a:prstGeom prst="rect">
+            <a:avLst/>
+          </a:prstGeom>
+          <a:noFill/>
+        </p:spPr>
+        <p:txBody>
+          <a:bodyPr wrap="square" lIns="0" tIns="0" rIns="0" bIns="0" rtlCol="0">
+            <a:spAutoFit/>
+          </a:bodyPr>
+          <a:lstStyle/>
+          <a:p>
+            <a:pPr algn="ctr"/>
+            <a:r>
+              <a:rPr lang="en-US" sz="1600" dirty="0"/>
+              <a:t>k</a:t>
+            </a:r>
+            <a:r>
+              <a:rPr lang="en-US" sz="1600" baseline="-25000" dirty="0"/>
+              <a:t>onTL      </a:t>
+            </a:r>
+            <a:r>
+              <a:rPr lang="en-US" sz="1600" dirty="0"/>
+              <a:t>k</a:t>
+            </a:r>
+            <a:r>
+              <a:rPr lang="en-US" sz="1600" baseline="-25000" dirty="0"/>
+              <a:t>offTL</a:t>
+            </a:r>
+          </a:p>
+        </p:txBody>
+      </p:sp>
+      <p:grpSp>
+        <p:nvGrpSpPr>
+          <p:cNvPr id="44" name="Group 43">
+            <a:extLst>
+              <a:ext uri="{FF2B5EF4-FFF2-40B4-BE49-F238E27FC236}">
+                <a16:creationId xmlns:a16="http://schemas.microsoft.com/office/drawing/2014/main" id="{2099199F-CD75-2B4E-8CF6-B0E61D00196E}"/>
+              </a:ext>
+            </a:extLst>
+          </p:cNvPr>
+          <p:cNvGrpSpPr/>
+          <p:nvPr/>
+        </p:nvGrpSpPr>
+        <p:grpSpPr>
+          <a:xfrm>
+            <a:off x="3108849" y="4390573"/>
+            <a:ext cx="89815" cy="786693"/>
+            <a:chOff x="3612754" y="2961087"/>
+            <a:chExt cx="52695" cy="913068"/>
+          </a:xfrm>
+          <a:noFill/>
+        </p:grpSpPr>
+        <p:cxnSp>
+          <p:nvCxnSpPr>
+            <p:cNvPr id="45" name="Straight Arrow Connector 44">
+              <a:extLst>
+                <a:ext uri="{FF2B5EF4-FFF2-40B4-BE49-F238E27FC236}">
+                  <a16:creationId xmlns:a16="http://schemas.microsoft.com/office/drawing/2014/main" id="{E08E2580-D7C5-7543-8C99-33653B443D56}"/>
+                </a:ext>
+              </a:extLst>
+            </p:cNvPr>
+            <p:cNvCxnSpPr/>
+            <p:nvPr/>
+          </p:nvCxnSpPr>
+          <p:spPr>
+            <a:xfrm flipV="1">
+              <a:off x="3665449" y="2961087"/>
+              <a:ext cx="0" cy="893369"/>
+            </a:xfrm>
+            <a:prstGeom prst="straightConnector1">
+              <a:avLst/>
+            </a:prstGeom>
+            <a:grpFill/>
+            <a:ln w="19050" cmpd="sng">
+              <a:solidFill>
+                <a:schemeClr val="tx1"/>
+              </a:solidFill>
+              <a:headEnd type="none" w="med" len="med"/>
+              <a:tailEnd type="arrow" w="med" len="med"/>
+            </a:ln>
+            <a:effectLst/>
+          </p:spPr>
+          <p:style>
+            <a:lnRef idx="2">
+              <a:schemeClr val="accent1"/>
+            </a:lnRef>
+            <a:fillRef idx="0">
+              <a:schemeClr val="accent1"/>
+            </a:fillRef>
+            <a:effectRef idx="1">
+              <a:schemeClr val="accent1"/>
+            </a:effectRef>
+            <a:fontRef idx="minor">
+              <a:schemeClr val="tx1"/>
+            </a:fontRef>
+          </p:style>
+        </p:cxnSp>
+        <p:cxnSp>
+          <p:nvCxnSpPr>
+            <p:cNvPr id="46" name="Straight Arrow Connector 45">
+              <a:extLst>
+                <a:ext uri="{FF2B5EF4-FFF2-40B4-BE49-F238E27FC236}">
+                  <a16:creationId xmlns:a16="http://schemas.microsoft.com/office/drawing/2014/main" id="{BF434A91-CA95-894A-B080-41540070BFE7}"/>
+                </a:ext>
+              </a:extLst>
+            </p:cNvPr>
+            <p:cNvCxnSpPr/>
+            <p:nvPr/>
+          </p:nvCxnSpPr>
+          <p:spPr>
+            <a:xfrm>
+              <a:off x="3612754" y="2984384"/>
+              <a:ext cx="0" cy="889771"/>
+            </a:xfrm>
+            <a:prstGeom prst="straightConnector1">
+              <a:avLst/>
+            </a:prstGeom>
+            <a:grpFill/>
+            <a:ln w="19050" cmpd="sng">
+              <a:solidFill>
+                <a:schemeClr val="tx1"/>
+              </a:solidFill>
+              <a:headEnd type="none" w="med" len="med"/>
+              <a:tailEnd type="arrow" w="med" len="med"/>
+            </a:ln>
+            <a:effectLst/>
+          </p:spPr>
+          <p:style>
+            <a:lnRef idx="2">
+              <a:schemeClr val="accent1"/>
+            </a:lnRef>
+            <a:fillRef idx="0">
+              <a:schemeClr val="accent1"/>
+            </a:fillRef>
+            <a:effectRef idx="1">
+              <a:schemeClr val="accent1"/>
+            </a:effectRef>
+            <a:fontRef idx="minor">
+              <a:schemeClr val="tx1"/>
+            </a:fontRef>
+          </p:style>
+        </p:cxnSp>
+      </p:grpSp>
+      <p:grpSp>
+        <p:nvGrpSpPr>
+          <p:cNvPr id="47" name="Group 46">
+            <a:extLst>
+              <a:ext uri="{FF2B5EF4-FFF2-40B4-BE49-F238E27FC236}">
+                <a16:creationId xmlns:a16="http://schemas.microsoft.com/office/drawing/2014/main" id="{F019DD68-2422-3847-B208-4303FCC585FF}"/>
+              </a:ext>
+            </a:extLst>
+          </p:cNvPr>
+          <p:cNvGrpSpPr/>
+          <p:nvPr/>
+        </p:nvGrpSpPr>
+        <p:grpSpPr>
+          <a:xfrm>
+            <a:off x="5253556" y="4367423"/>
+            <a:ext cx="89815" cy="786693"/>
+            <a:chOff x="3612754" y="2961087"/>
+            <a:chExt cx="52695" cy="913068"/>
+          </a:xfrm>
+          <a:noFill/>
+        </p:grpSpPr>
+        <p:cxnSp>
+          <p:nvCxnSpPr>
+            <p:cNvPr id="48" name="Straight Arrow Connector 47">
+              <a:extLst>
+                <a:ext uri="{FF2B5EF4-FFF2-40B4-BE49-F238E27FC236}">
+                  <a16:creationId xmlns:a16="http://schemas.microsoft.com/office/drawing/2014/main" id="{6F389550-E36D-6545-935C-4D5D0B343F82}"/>
+                </a:ext>
+              </a:extLst>
+            </p:cNvPr>
+            <p:cNvCxnSpPr/>
+            <p:nvPr/>
+          </p:nvCxnSpPr>
+          <p:spPr>
+            <a:xfrm flipV="1">
+              <a:off x="3665449" y="2961087"/>
+              <a:ext cx="0" cy="893369"/>
+            </a:xfrm>
+            <a:prstGeom prst="straightConnector1">
+              <a:avLst/>
+            </a:prstGeom>
+            <a:grpFill/>
+            <a:ln w="19050" cmpd="sng">
+              <a:solidFill>
+                <a:schemeClr val="tx1"/>
+              </a:solidFill>
+              <a:headEnd type="none" w="med" len="med"/>
+              <a:tailEnd type="arrow" w="med" len="med"/>
+            </a:ln>
+            <a:effectLst/>
+          </p:spPr>
+          <p:style>
+            <a:lnRef idx="2">
+              <a:schemeClr val="accent1"/>
+            </a:lnRef>
+            <a:fillRef idx="0">
+              <a:schemeClr val="accent1"/>
+            </a:fillRef>
+            <a:effectRef idx="1">
+              <a:schemeClr val="accent1"/>
+            </a:effectRef>
+            <a:fontRef idx="minor">
+              <a:schemeClr val="tx1"/>
+            </a:fontRef>
+          </p:style>
+        </p:cxnSp>
+        <p:cxnSp>
+          <p:nvCxnSpPr>
+            <p:cNvPr id="49" name="Straight Arrow Connector 48">
+              <a:extLst>
+                <a:ext uri="{FF2B5EF4-FFF2-40B4-BE49-F238E27FC236}">
+                  <a16:creationId xmlns:a16="http://schemas.microsoft.com/office/drawing/2014/main" id="{F852F149-AB76-EB4F-A913-8763980795AB}"/>
+                </a:ext>
+              </a:extLst>
+            </p:cNvPr>
+            <p:cNvCxnSpPr/>
+            <p:nvPr/>
+          </p:nvCxnSpPr>
+          <p:spPr>
+            <a:xfrm>
+              <a:off x="3612754" y="2984384"/>
+              <a:ext cx="0" cy="889771"/>
+            </a:xfrm>
+            <a:prstGeom prst="straightConnector1">
+              <a:avLst/>
+            </a:prstGeom>
+            <a:grpFill/>
+            <a:ln w="19050" cmpd="sng">
+              <a:solidFill>
+                <a:schemeClr val="tx1"/>
+              </a:solidFill>
+              <a:headEnd type="none" w="med" len="med"/>
+              <a:tailEnd type="arrow" w="med" len="med"/>
+            </a:ln>
+            <a:effectLst/>
+          </p:spPr>
+          <p:style>
+            <a:lnRef idx="2">
+              <a:schemeClr val="accent1"/>
+            </a:lnRef>
+            <a:fillRef idx="0">
+              <a:schemeClr val="accent1"/>
+            </a:fillRef>
+            <a:effectRef idx="1">
+              <a:schemeClr val="accent1"/>
+            </a:effectRef>
+            <a:fontRef idx="minor">
+              <a:schemeClr val="tx1"/>
+            </a:fontRef>
+          </p:style>
+        </p:cxnSp>
+      </p:grpSp>
+      <p:grpSp>
+        <p:nvGrpSpPr>
+          <p:cNvPr id="6" name="Group 5">
+            <a:extLst>
+              <a:ext uri="{FF2B5EF4-FFF2-40B4-BE49-F238E27FC236}">
+                <a16:creationId xmlns:a16="http://schemas.microsoft.com/office/drawing/2014/main" id="{EC280116-B66F-194B-A449-3BE01B950F76}"/>
+              </a:ext>
+            </a:extLst>
+          </p:cNvPr>
+          <p:cNvGrpSpPr/>
+          <p:nvPr/>
+        </p:nvGrpSpPr>
+        <p:grpSpPr>
+          <a:xfrm>
+            <a:off x="1350807" y="3277011"/>
+            <a:ext cx="711957" cy="738664"/>
+            <a:chOff x="1774877" y="2226461"/>
+            <a:chExt cx="711957" cy="738664"/>
+          </a:xfrm>
+          <a:noFill/>
+        </p:grpSpPr>
+        <p:sp>
+          <p:nvSpPr>
+            <p:cNvPr id="36" name="TextBox 35">
+              <a:extLst>
+                <a:ext uri="{FF2B5EF4-FFF2-40B4-BE49-F238E27FC236}">
+                  <a16:creationId xmlns:a16="http://schemas.microsoft.com/office/drawing/2014/main" id="{2D909DAC-152C-6341-BDA3-E4322566F3B5}"/>
+                </a:ext>
+              </a:extLst>
+            </p:cNvPr>
+            <p:cNvSpPr txBox="1"/>
+            <p:nvPr/>
+          </p:nvSpPr>
+          <p:spPr>
+            <a:xfrm>
+              <a:off x="1829302" y="2226461"/>
+              <a:ext cx="657532" cy="738664"/>
+            </a:xfrm>
+            <a:prstGeom prst="rect">
+              <a:avLst/>
+            </a:prstGeom>
+            <a:grpFill/>
+          </p:spPr>
+          <p:txBody>
+            <a:bodyPr wrap="square" lIns="0" tIns="0" rIns="0" bIns="0" rtlCol="0">
+              <a:spAutoFit/>
+            </a:bodyPr>
+            <a:lstStyle/>
+            <a:p>
+              <a:r>
+                <a:rPr lang="en-US" sz="1600" dirty="0"/>
+                <a:t>k</a:t>
+              </a:r>
+              <a:r>
+                <a:rPr lang="en-US" sz="1600" baseline="-25000" dirty="0"/>
+                <a:t>12</a:t>
+              </a:r>
+            </a:p>
+            <a:p>
+              <a:r>
+                <a:rPr lang="en-US" sz="1600" dirty="0"/>
+                <a:t> </a:t>
+              </a:r>
+            </a:p>
+            <a:p>
+              <a:r>
+                <a:rPr lang="en-US" sz="1600" dirty="0"/>
+                <a:t>k</a:t>
+              </a:r>
+              <a:r>
+                <a:rPr lang="en-US" sz="1600" baseline="-25000" dirty="0"/>
+                <a:t>21</a:t>
+              </a:r>
+            </a:p>
+          </p:txBody>
+        </p:sp>
+        <p:grpSp>
+          <p:nvGrpSpPr>
+            <p:cNvPr id="50" name="Group 49">
+              <a:extLst>
+                <a:ext uri="{FF2B5EF4-FFF2-40B4-BE49-F238E27FC236}">
+                  <a16:creationId xmlns:a16="http://schemas.microsoft.com/office/drawing/2014/main" id="{C22C52C2-85DE-A841-8581-B02DF1C8B21C}"/>
+                </a:ext>
+              </a:extLst>
+            </p:cNvPr>
+            <p:cNvGrpSpPr/>
+            <p:nvPr/>
+          </p:nvGrpSpPr>
+          <p:grpSpPr>
+            <a:xfrm rot="5400000">
+              <a:off x="1871371" y="2448979"/>
+              <a:ext cx="154676" cy="347663"/>
+              <a:chOff x="3612754" y="2961087"/>
+              <a:chExt cx="52695" cy="913068"/>
+            </a:xfrm>
+            <a:grpFill/>
+          </p:grpSpPr>
+          <p:cxnSp>
+            <p:nvCxnSpPr>
+              <p:cNvPr id="51" name="Straight Arrow Connector 50">
+                <a:extLst>
+                  <a:ext uri="{FF2B5EF4-FFF2-40B4-BE49-F238E27FC236}">
+                    <a16:creationId xmlns:a16="http://schemas.microsoft.com/office/drawing/2014/main" id="{6E28B298-A494-B244-A0D6-D04ADBF77328}"/>
+                  </a:ext>
+                </a:extLst>
+              </p:cNvPr>
+              <p:cNvCxnSpPr/>
+              <p:nvPr/>
+            </p:nvCxnSpPr>
+            <p:spPr>
+              <a:xfrm flipV="1">
+                <a:off x="3665449" y="2961087"/>
+                <a:ext cx="0" cy="893369"/>
+              </a:xfrm>
+              <a:prstGeom prst="straightConnector1">
+                <a:avLst/>
+              </a:prstGeom>
+              <a:grpFill/>
+              <a:ln w="19050" cmpd="sng">
+                <a:solidFill>
+                  <a:schemeClr val="tx1"/>
+                </a:solidFill>
+                <a:headEnd type="none" w="med" len="med"/>
+                <a:tailEnd type="arrow" w="med" len="med"/>
+              </a:ln>
+              <a:effectLst/>
+            </p:spPr>
+            <p:style>
+              <a:lnRef idx="2">
+                <a:schemeClr val="accent1"/>
+              </a:lnRef>
+              <a:fillRef idx="0">
+                <a:schemeClr val="accent1"/>
+              </a:fillRef>
+              <a:effectRef idx="1">
+                <a:schemeClr val="accent1"/>
+              </a:effectRef>
+              <a:fontRef idx="minor">
+                <a:schemeClr val="tx1"/>
+              </a:fontRef>
+            </p:style>
+          </p:cxnSp>
+          <p:cxnSp>
+            <p:nvCxnSpPr>
+              <p:cNvPr id="52" name="Straight Arrow Connector 51">
+                <a:extLst>
+                  <a:ext uri="{FF2B5EF4-FFF2-40B4-BE49-F238E27FC236}">
+                    <a16:creationId xmlns:a16="http://schemas.microsoft.com/office/drawing/2014/main" id="{F749A21A-61F3-E94D-A86B-1C66A97B5A7F}"/>
+                  </a:ext>
+                </a:extLst>
+              </p:cNvPr>
+              <p:cNvCxnSpPr/>
+              <p:nvPr/>
+            </p:nvCxnSpPr>
+            <p:spPr>
+              <a:xfrm>
+                <a:off x="3612754" y="2984384"/>
+                <a:ext cx="0" cy="889771"/>
+              </a:xfrm>
+              <a:prstGeom prst="straightConnector1">
+                <a:avLst/>
+              </a:prstGeom>
+              <a:grpFill/>
+              <a:ln w="19050" cmpd="sng">
+                <a:solidFill>
+                  <a:schemeClr val="tx1"/>
+                </a:solidFill>
+                <a:headEnd type="none" w="med" len="med"/>
+                <a:tailEnd type="arrow" w="med" len="med"/>
+              </a:ln>
+              <a:effectLst/>
+            </p:spPr>
+            <p:style>
+              <a:lnRef idx="2">
+                <a:schemeClr val="accent1"/>
+              </a:lnRef>
+              <a:fillRef idx="0">
+                <a:schemeClr val="accent1"/>
+              </a:fillRef>
+              <a:effectRef idx="1">
+                <a:schemeClr val="accent1"/>
+              </a:effectRef>
+              <a:fontRef idx="minor">
+                <a:schemeClr val="tx1"/>
+              </a:fontRef>
+            </p:style>
+          </p:cxnSp>
+        </p:grpSp>
+      </p:grpSp>
+      <p:sp>
+        <p:nvSpPr>
+          <p:cNvPr id="53" name="TextBox 52">
+            <a:extLst>
+              <a:ext uri="{FF2B5EF4-FFF2-40B4-BE49-F238E27FC236}">
+                <a16:creationId xmlns:a16="http://schemas.microsoft.com/office/drawing/2014/main" id="{63248A25-6099-7A4E-BF24-8F19720B9B01}"/>
+              </a:ext>
+            </a:extLst>
+          </p:cNvPr>
+          <p:cNvSpPr txBox="1"/>
+          <p:nvPr/>
+        </p:nvSpPr>
+        <p:spPr>
+          <a:xfrm>
+            <a:off x="2003814" y="4027250"/>
+            <a:ext cx="326694" cy="246221"/>
+          </a:xfrm>
+          <a:prstGeom prst="rect">
+            <a:avLst/>
+          </a:prstGeom>
+          <a:noFill/>
+        </p:spPr>
+        <p:txBody>
+          <a:bodyPr wrap="square" lIns="0" tIns="0" rIns="0" bIns="0" rtlCol="0">
+            <a:spAutoFit/>
+          </a:bodyPr>
+          <a:lstStyle/>
+          <a:p>
+            <a:r>
+              <a:rPr lang="en-US" sz="1600" dirty="0"/>
+              <a:t>k</a:t>
+            </a:r>
+            <a:r>
+              <a:rPr lang="en-US" sz="1600" baseline="-25000" dirty="0"/>
+              <a:t>eD</a:t>
+            </a:r>
+          </a:p>
+        </p:txBody>
+      </p:sp>
+      <p:cxnSp>
+        <p:nvCxnSpPr>
+          <p:cNvPr id="54" name="Straight Arrow Connector 53">
+            <a:extLst>
+              <a:ext uri="{FF2B5EF4-FFF2-40B4-BE49-F238E27FC236}">
+                <a16:creationId xmlns:a16="http://schemas.microsoft.com/office/drawing/2014/main" id="{62ED5D12-F606-B74A-839E-D6711C0FF856}"/>
+              </a:ext>
+            </a:extLst>
+          </p:cNvPr>
+          <p:cNvCxnSpPr/>
+          <p:nvPr/>
+        </p:nvCxnSpPr>
+        <p:spPr>
+          <a:xfrm>
+            <a:off x="6026520" y="4061940"/>
+            <a:ext cx="0" cy="374237"/>
+          </a:xfrm>
+          <a:prstGeom prst="straightConnector1">
+            <a:avLst/>
+          </a:prstGeom>
+          <a:ln>
+            <a:solidFill>
+              <a:schemeClr val="tx1"/>
+            </a:solidFill>
+            <a:tailEnd type="arrow"/>
+          </a:ln>
+          <a:effectLst/>
+        </p:spPr>
+        <p:style>
+          <a:lnRef idx="2">
+            <a:schemeClr val="accent1"/>
+          </a:lnRef>
+          <a:fillRef idx="0">
+            <a:schemeClr val="accent1"/>
+          </a:fillRef>
+          <a:effectRef idx="1">
+            <a:schemeClr val="accent1"/>
+          </a:effectRef>
+          <a:fontRef idx="minor">
+            <a:schemeClr val="tx1"/>
+          </a:fontRef>
+        </p:style>
+      </p:cxnSp>
+      <p:cxnSp>
+        <p:nvCxnSpPr>
+          <p:cNvPr id="55" name="Straight Arrow Connector 54">
+            <a:extLst>
+              <a:ext uri="{FF2B5EF4-FFF2-40B4-BE49-F238E27FC236}">
+                <a16:creationId xmlns:a16="http://schemas.microsoft.com/office/drawing/2014/main" id="{1A24C079-124A-F14E-886C-F6EFB9E5CCFC}"/>
+              </a:ext>
+            </a:extLst>
+          </p:cNvPr>
+          <p:cNvCxnSpPr/>
+          <p:nvPr/>
+        </p:nvCxnSpPr>
+        <p:spPr>
+          <a:xfrm>
+            <a:off x="2359647" y="4037126"/>
+            <a:ext cx="0" cy="374237"/>
+          </a:xfrm>
+          <a:prstGeom prst="straightConnector1">
+            <a:avLst/>
+          </a:prstGeom>
+          <a:ln>
+            <a:solidFill>
+              <a:schemeClr val="tx1"/>
+            </a:solidFill>
+            <a:tailEnd type="arrow"/>
+          </a:ln>
+          <a:effectLst/>
+        </p:spPr>
+        <p:style>
+          <a:lnRef idx="2">
+            <a:schemeClr val="accent1"/>
+          </a:lnRef>
+          <a:fillRef idx="0">
+            <a:schemeClr val="accent1"/>
+          </a:fillRef>
+          <a:effectRef idx="1">
+            <a:schemeClr val="accent1"/>
+          </a:effectRef>
+          <a:fontRef idx="minor">
+            <a:schemeClr val="tx1"/>
+          </a:fontRef>
+        </p:style>
+      </p:cxnSp>
+      <p:sp>
+        <p:nvSpPr>
+          <p:cNvPr id="56" name="TextBox 55">
+            <a:extLst>
+              <a:ext uri="{FF2B5EF4-FFF2-40B4-BE49-F238E27FC236}">
+                <a16:creationId xmlns:a16="http://schemas.microsoft.com/office/drawing/2014/main" id="{D330F9E6-BBA9-564B-92B1-B961C0CF6018}"/>
+              </a:ext>
+            </a:extLst>
+          </p:cNvPr>
+          <p:cNvSpPr txBox="1"/>
+          <p:nvPr/>
+        </p:nvSpPr>
+        <p:spPr>
+          <a:xfrm>
+            <a:off x="3555872" y="2861161"/>
+            <a:ext cx="1442290" cy="646331"/>
+          </a:xfrm>
+          <a:prstGeom prst="rect">
+            <a:avLst/>
+          </a:prstGeom>
+          <a:solidFill>
+            <a:schemeClr val="bg2">
+              <a:lumMod val="85000"/>
+            </a:schemeClr>
+          </a:solidFill>
+          <a:ln>
+            <a:noFill/>
+          </a:ln>
+        </p:spPr>
+        <p:txBody>
+          <a:bodyPr wrap="square" rtlCol="0">
+            <a:spAutoFit/>
+          </a:bodyPr>
+          <a:lstStyle/>
+          <a:p>
+            <a:pPr algn="ctr"/>
+            <a:r>
+              <a:rPr lang="en-US" dirty="0"/>
+              <a:t>Mem T</a:t>
+            </a:r>
+            <a:r>
+              <a:rPr lang="en-US" sz="1800" dirty="0"/>
+              <a:t>arget</a:t>
+            </a:r>
+          </a:p>
+          <a:p>
+            <a:pPr algn="ctr"/>
+            <a:r>
+              <a:rPr lang="en-US" dirty="0"/>
+              <a:t>(Tm)</a:t>
+            </a:r>
+            <a:endParaRPr lang="en-US" sz="1800" dirty="0"/>
+          </a:p>
+        </p:txBody>
+      </p:sp>
+      <p:sp>
+        <p:nvSpPr>
+          <p:cNvPr id="57" name="TextBox 56">
+            <a:extLst>
+              <a:ext uri="{FF2B5EF4-FFF2-40B4-BE49-F238E27FC236}">
+                <a16:creationId xmlns:a16="http://schemas.microsoft.com/office/drawing/2014/main" id="{53E4F459-85CC-5C4B-A9C0-2F9F17AC9E4E}"/>
+              </a:ext>
+            </a:extLst>
+          </p:cNvPr>
+          <p:cNvSpPr txBox="1"/>
+          <p:nvPr/>
+        </p:nvSpPr>
+        <p:spPr>
+          <a:xfrm>
+            <a:off x="2914512" y="2999238"/>
+            <a:ext cx="484227" cy="707886"/>
+          </a:xfrm>
+          <a:prstGeom prst="rect">
+            <a:avLst/>
+          </a:prstGeom>
+          <a:noFill/>
+        </p:spPr>
+        <p:txBody>
+          <a:bodyPr wrap="none" rtlCol="0">
+            <a:spAutoFit/>
+          </a:bodyPr>
+          <a:lstStyle/>
+          <a:p>
+            <a:r>
+              <a:rPr lang="en-US" sz="4000" dirty="0"/>
+              <a:t>+</a:t>
+            </a:r>
+          </a:p>
+        </p:txBody>
+      </p:sp>
+      <p:sp>
+        <p:nvSpPr>
+          <p:cNvPr id="58" name="TextBox 57">
+            <a:extLst>
+              <a:ext uri="{FF2B5EF4-FFF2-40B4-BE49-F238E27FC236}">
+                <a16:creationId xmlns:a16="http://schemas.microsoft.com/office/drawing/2014/main" id="{4E7C6078-ACDF-1D41-8244-D6DA8FD312E5}"/>
+              </a:ext>
+            </a:extLst>
+          </p:cNvPr>
+          <p:cNvSpPr txBox="1"/>
+          <p:nvPr/>
+        </p:nvSpPr>
+        <p:spPr>
+          <a:xfrm>
+            <a:off x="5073740" y="3012266"/>
+            <a:ext cx="484227" cy="707886"/>
+          </a:xfrm>
+          <a:prstGeom prst="rect">
+            <a:avLst/>
+          </a:prstGeom>
+          <a:noFill/>
+        </p:spPr>
+        <p:txBody>
+          <a:bodyPr wrap="none" rtlCol="0">
+            <a:spAutoFit/>
+          </a:bodyPr>
+          <a:lstStyle/>
+          <a:p>
+            <a:r>
+              <a:rPr lang="en-US" sz="4000" dirty="0"/>
+              <a:t>+</a:t>
+            </a:r>
+          </a:p>
+        </p:txBody>
+      </p:sp>
+      <p:sp>
+        <p:nvSpPr>
+          <p:cNvPr id="69" name="TextBox 68">
+            <a:extLst>
+              <a:ext uri="{FF2B5EF4-FFF2-40B4-BE49-F238E27FC236}">
+                <a16:creationId xmlns:a16="http://schemas.microsoft.com/office/drawing/2014/main" id="{48B37233-8816-3D4A-91D7-7068A37E0C9A}"/>
+              </a:ext>
+            </a:extLst>
+          </p:cNvPr>
+          <p:cNvSpPr txBox="1"/>
+          <p:nvPr/>
+        </p:nvSpPr>
+        <p:spPr>
+          <a:xfrm>
+            <a:off x="2630441" y="1426127"/>
+            <a:ext cx="1095173" cy="646331"/>
+          </a:xfrm>
+          <a:prstGeom prst="rect">
+            <a:avLst/>
+          </a:prstGeom>
+          <a:solidFill>
+            <a:schemeClr val="bg2">
+              <a:lumMod val="85000"/>
+            </a:schemeClr>
+          </a:solidFill>
+          <a:ln>
+            <a:noFill/>
+          </a:ln>
+        </p:spPr>
+        <p:txBody>
+          <a:bodyPr wrap="none" rtlCol="0">
+            <a:spAutoFit/>
+          </a:bodyPr>
+          <a:lstStyle/>
+          <a:p>
+            <a:pPr algn="ctr"/>
+            <a:r>
+              <a:rPr lang="en-US" sz="1800" dirty="0"/>
+              <a:t>Complex</a:t>
+            </a:r>
+          </a:p>
+          <a:p>
+            <a:pPr algn="ctr"/>
+            <a:r>
+              <a:rPr lang="en-US" sz="1800" dirty="0"/>
+              <a:t>(DTm)</a:t>
+            </a:r>
+          </a:p>
+        </p:txBody>
+      </p:sp>
+      <p:sp>
+        <p:nvSpPr>
+          <p:cNvPr id="70" name="TextBox 69">
+            <a:extLst>
+              <a:ext uri="{FF2B5EF4-FFF2-40B4-BE49-F238E27FC236}">
+                <a16:creationId xmlns:a16="http://schemas.microsoft.com/office/drawing/2014/main" id="{E91BDE91-F2A7-574F-AD16-BEF64F55E3E3}"/>
+              </a:ext>
+            </a:extLst>
+          </p:cNvPr>
+          <p:cNvSpPr txBox="1"/>
+          <p:nvPr/>
+        </p:nvSpPr>
+        <p:spPr>
+          <a:xfrm>
+            <a:off x="4773322" y="1426127"/>
+            <a:ext cx="1095172" cy="646331"/>
+          </a:xfrm>
+          <a:prstGeom prst="rect">
+            <a:avLst/>
+          </a:prstGeom>
+          <a:solidFill>
+            <a:schemeClr val="bg2">
+              <a:lumMod val="85000"/>
+            </a:schemeClr>
+          </a:solidFill>
+          <a:ln>
+            <a:noFill/>
+          </a:ln>
+        </p:spPr>
+        <p:txBody>
+          <a:bodyPr wrap="none" rtlCol="0">
+            <a:spAutoFit/>
+          </a:bodyPr>
+          <a:lstStyle/>
+          <a:p>
+            <a:pPr algn="ctr"/>
+            <a:r>
+              <a:rPr lang="en-US" sz="1800" dirty="0"/>
+              <a:t>Complex</a:t>
+            </a:r>
+          </a:p>
+          <a:p>
+            <a:pPr algn="ctr"/>
+            <a:r>
+              <a:rPr lang="en-US" sz="1800" dirty="0"/>
+              <a:t>(TmL)</a:t>
+            </a:r>
+          </a:p>
+        </p:txBody>
+      </p:sp>
+      <p:cxnSp>
+        <p:nvCxnSpPr>
+          <p:cNvPr id="71" name="Straight Arrow Connector 70">
+            <a:extLst>
+              <a:ext uri="{FF2B5EF4-FFF2-40B4-BE49-F238E27FC236}">
+                <a16:creationId xmlns:a16="http://schemas.microsoft.com/office/drawing/2014/main" id="{5ED04F55-3E2B-7143-958E-8772855A28F7}"/>
+              </a:ext>
+            </a:extLst>
+          </p:cNvPr>
+          <p:cNvCxnSpPr/>
+          <p:nvPr/>
+        </p:nvCxnSpPr>
+        <p:spPr>
+          <a:xfrm>
+            <a:off x="3638094" y="2096402"/>
+            <a:ext cx="0" cy="290677"/>
+          </a:xfrm>
+          <a:prstGeom prst="straightConnector1">
+            <a:avLst/>
+          </a:prstGeom>
+          <a:ln>
+            <a:solidFill>
+              <a:schemeClr val="tx1"/>
+            </a:solidFill>
+            <a:tailEnd type="arrow"/>
+          </a:ln>
+          <a:effectLst/>
+        </p:spPr>
+        <p:style>
+          <a:lnRef idx="2">
+            <a:schemeClr val="accent1"/>
+          </a:lnRef>
+          <a:fillRef idx="0">
+            <a:schemeClr val="accent1"/>
+          </a:fillRef>
+          <a:effectRef idx="1">
+            <a:schemeClr val="accent1"/>
+          </a:effectRef>
+          <a:fontRef idx="minor">
+            <a:schemeClr val="tx1"/>
+          </a:fontRef>
+        </p:style>
+      </p:cxnSp>
+      <p:cxnSp>
+        <p:nvCxnSpPr>
+          <p:cNvPr id="72" name="Straight Arrow Connector 71">
+            <a:extLst>
+              <a:ext uri="{FF2B5EF4-FFF2-40B4-BE49-F238E27FC236}">
+                <a16:creationId xmlns:a16="http://schemas.microsoft.com/office/drawing/2014/main" id="{523FA8E4-73CC-C04B-AD0D-BABFBD1DB8F4}"/>
+              </a:ext>
+            </a:extLst>
+          </p:cNvPr>
+          <p:cNvCxnSpPr/>
+          <p:nvPr/>
+        </p:nvCxnSpPr>
+        <p:spPr>
+          <a:xfrm>
+            <a:off x="5801963" y="2096402"/>
+            <a:ext cx="0" cy="290677"/>
+          </a:xfrm>
+          <a:prstGeom prst="straightConnector1">
+            <a:avLst/>
+          </a:prstGeom>
+          <a:ln>
+            <a:solidFill>
+              <a:schemeClr val="tx1"/>
+            </a:solidFill>
+            <a:tailEnd type="arrow"/>
+          </a:ln>
+          <a:effectLst/>
+        </p:spPr>
+        <p:style>
+          <a:lnRef idx="2">
+            <a:schemeClr val="accent1"/>
+          </a:lnRef>
+          <a:fillRef idx="0">
+            <a:schemeClr val="accent1"/>
+          </a:fillRef>
+          <a:effectRef idx="1">
+            <a:schemeClr val="accent1"/>
+          </a:effectRef>
+          <a:fontRef idx="minor">
+            <a:schemeClr val="tx1"/>
+          </a:fontRef>
+        </p:style>
+      </p:cxnSp>
+      <p:sp>
+        <p:nvSpPr>
+          <p:cNvPr id="74" name="TextBox 73">
+            <a:extLst>
+              <a:ext uri="{FF2B5EF4-FFF2-40B4-BE49-F238E27FC236}">
+                <a16:creationId xmlns:a16="http://schemas.microsoft.com/office/drawing/2014/main" id="{799F8187-91B2-2E4C-B209-BA3845292169}"/>
+              </a:ext>
+            </a:extLst>
+          </p:cNvPr>
+          <p:cNvSpPr txBox="1"/>
+          <p:nvPr/>
+        </p:nvSpPr>
+        <p:spPr>
+          <a:xfrm>
+            <a:off x="3674302" y="2050480"/>
+            <a:ext cx="657532" cy="246221"/>
+          </a:xfrm>
+          <a:prstGeom prst="rect">
+            <a:avLst/>
+          </a:prstGeom>
+          <a:noFill/>
+        </p:spPr>
+        <p:txBody>
+          <a:bodyPr wrap="square" lIns="0" tIns="0" rIns="0" bIns="0" rtlCol="0">
+            <a:spAutoFit/>
+          </a:bodyPr>
+          <a:lstStyle/>
+          <a:p>
+            <a:r>
+              <a:rPr lang="en-US" sz="1600" dirty="0"/>
+              <a:t>k</a:t>
+            </a:r>
+            <a:r>
+              <a:rPr lang="en-US" sz="1600" baseline="-25000" dirty="0"/>
+              <a:t>eDTm</a:t>
+            </a:r>
+          </a:p>
+        </p:txBody>
+      </p:sp>
+      <p:sp>
+        <p:nvSpPr>
+          <p:cNvPr id="75" name="TextBox 74">
+            <a:extLst>
+              <a:ext uri="{FF2B5EF4-FFF2-40B4-BE49-F238E27FC236}">
+                <a16:creationId xmlns:a16="http://schemas.microsoft.com/office/drawing/2014/main" id="{714D1CF7-29DB-2446-94D9-D9A050E65302}"/>
+              </a:ext>
+            </a:extLst>
+          </p:cNvPr>
+          <p:cNvSpPr txBox="1"/>
+          <p:nvPr/>
+        </p:nvSpPr>
+        <p:spPr>
+          <a:xfrm>
+            <a:off x="5841389" y="2062055"/>
+            <a:ext cx="657532" cy="246221"/>
+          </a:xfrm>
+          <a:prstGeom prst="rect">
+            <a:avLst/>
+          </a:prstGeom>
+          <a:noFill/>
+        </p:spPr>
+        <p:txBody>
+          <a:bodyPr wrap="square" lIns="0" tIns="0" rIns="0" bIns="0" rtlCol="0">
+            <a:spAutoFit/>
+          </a:bodyPr>
+          <a:lstStyle/>
+          <a:p>
+            <a:r>
+              <a:rPr lang="en-US" sz="1600" dirty="0"/>
+              <a:t>k</a:t>
+            </a:r>
+            <a:r>
+              <a:rPr lang="en-US" sz="1600" baseline="-25000" dirty="0"/>
+              <a:t>eTLm</a:t>
+            </a:r>
+          </a:p>
+        </p:txBody>
+      </p:sp>
+      <p:grpSp>
+        <p:nvGrpSpPr>
+          <p:cNvPr id="77" name="Group 76">
+            <a:extLst>
+              <a:ext uri="{FF2B5EF4-FFF2-40B4-BE49-F238E27FC236}">
+                <a16:creationId xmlns:a16="http://schemas.microsoft.com/office/drawing/2014/main" id="{5CA546EA-D863-B840-8171-9951DE1F3D56}"/>
+              </a:ext>
+            </a:extLst>
+          </p:cNvPr>
+          <p:cNvGrpSpPr/>
+          <p:nvPr/>
+        </p:nvGrpSpPr>
+        <p:grpSpPr>
+          <a:xfrm flipV="1">
+            <a:off x="3108849" y="2248257"/>
+            <a:ext cx="89815" cy="786693"/>
+            <a:chOff x="3612754" y="2961087"/>
+            <a:chExt cx="52695" cy="913068"/>
+          </a:xfrm>
+          <a:noFill/>
+        </p:grpSpPr>
+        <p:cxnSp>
+          <p:nvCxnSpPr>
+            <p:cNvPr id="78" name="Straight Arrow Connector 77">
+              <a:extLst>
+                <a:ext uri="{FF2B5EF4-FFF2-40B4-BE49-F238E27FC236}">
+                  <a16:creationId xmlns:a16="http://schemas.microsoft.com/office/drawing/2014/main" id="{80EE1D6C-1DB2-FE45-9446-97CDF2E3B15B}"/>
+                </a:ext>
+              </a:extLst>
+            </p:cNvPr>
+            <p:cNvCxnSpPr/>
+            <p:nvPr/>
+          </p:nvCxnSpPr>
+          <p:spPr>
+            <a:xfrm flipV="1">
+              <a:off x="3665449" y="2961087"/>
+              <a:ext cx="0" cy="893369"/>
+            </a:xfrm>
+            <a:prstGeom prst="straightConnector1">
+              <a:avLst/>
+            </a:prstGeom>
+            <a:grpFill/>
+            <a:ln w="19050" cmpd="sng">
+              <a:solidFill>
+                <a:schemeClr val="tx1"/>
+              </a:solidFill>
+              <a:headEnd type="none" w="med" len="med"/>
+              <a:tailEnd type="arrow" w="med" len="med"/>
+            </a:ln>
+            <a:effectLst/>
+          </p:spPr>
+          <p:style>
+            <a:lnRef idx="2">
+              <a:schemeClr val="accent1"/>
+            </a:lnRef>
+            <a:fillRef idx="0">
+              <a:schemeClr val="accent1"/>
+            </a:fillRef>
+            <a:effectRef idx="1">
+              <a:schemeClr val="accent1"/>
+            </a:effectRef>
+            <a:fontRef idx="minor">
+              <a:schemeClr val="tx1"/>
+            </a:fontRef>
+          </p:style>
+        </p:cxnSp>
+        <p:cxnSp>
+          <p:nvCxnSpPr>
+            <p:cNvPr id="79" name="Straight Arrow Connector 78">
+              <a:extLst>
+                <a:ext uri="{FF2B5EF4-FFF2-40B4-BE49-F238E27FC236}">
+                  <a16:creationId xmlns:a16="http://schemas.microsoft.com/office/drawing/2014/main" id="{8C42A42B-C959-1A4A-9E56-389C00A811FE}"/>
+                </a:ext>
+              </a:extLst>
+            </p:cNvPr>
+            <p:cNvCxnSpPr/>
+            <p:nvPr/>
+          </p:nvCxnSpPr>
+          <p:spPr>
+            <a:xfrm>
+              <a:off x="3612754" y="2984384"/>
+              <a:ext cx="0" cy="889771"/>
+            </a:xfrm>
+            <a:prstGeom prst="straightConnector1">
+              <a:avLst/>
+            </a:prstGeom>
+            <a:grpFill/>
+            <a:ln w="19050" cmpd="sng">
+              <a:solidFill>
+                <a:schemeClr val="tx1"/>
+              </a:solidFill>
+              <a:headEnd type="none" w="med" len="med"/>
+              <a:tailEnd type="arrow" w="med" len="med"/>
+            </a:ln>
+            <a:effectLst/>
+          </p:spPr>
+          <p:style>
+            <a:lnRef idx="2">
+              <a:schemeClr val="accent1"/>
+            </a:lnRef>
+            <a:fillRef idx="0">
+              <a:schemeClr val="accent1"/>
+            </a:fillRef>
+            <a:effectRef idx="1">
+              <a:schemeClr val="accent1"/>
+            </a:effectRef>
+            <a:fontRef idx="minor">
+              <a:schemeClr val="tx1"/>
+            </a:fontRef>
+          </p:style>
+        </p:cxnSp>
+      </p:grpSp>
+      <p:grpSp>
+        <p:nvGrpSpPr>
+          <p:cNvPr id="80" name="Group 79">
+            <a:extLst>
+              <a:ext uri="{FF2B5EF4-FFF2-40B4-BE49-F238E27FC236}">
+                <a16:creationId xmlns:a16="http://schemas.microsoft.com/office/drawing/2014/main" id="{245A0F0C-A33E-1649-92F0-EE245FB550B2}"/>
+              </a:ext>
+            </a:extLst>
+          </p:cNvPr>
+          <p:cNvGrpSpPr/>
+          <p:nvPr/>
+        </p:nvGrpSpPr>
+        <p:grpSpPr>
+          <a:xfrm flipV="1">
+            <a:off x="5253556" y="2225107"/>
+            <a:ext cx="89815" cy="786693"/>
+            <a:chOff x="3612754" y="2961087"/>
+            <a:chExt cx="52695" cy="913068"/>
+          </a:xfrm>
+          <a:noFill/>
+        </p:grpSpPr>
+        <p:cxnSp>
+          <p:nvCxnSpPr>
+            <p:cNvPr id="81" name="Straight Arrow Connector 80">
+              <a:extLst>
+                <a:ext uri="{FF2B5EF4-FFF2-40B4-BE49-F238E27FC236}">
+                  <a16:creationId xmlns:a16="http://schemas.microsoft.com/office/drawing/2014/main" id="{153E89D3-75D9-294E-B967-7A02840B9BAB}"/>
+                </a:ext>
+              </a:extLst>
+            </p:cNvPr>
+            <p:cNvCxnSpPr/>
+            <p:nvPr/>
+          </p:nvCxnSpPr>
+          <p:spPr>
+            <a:xfrm flipV="1">
+              <a:off x="3665449" y="2961087"/>
+              <a:ext cx="0" cy="893369"/>
+            </a:xfrm>
+            <a:prstGeom prst="straightConnector1">
+              <a:avLst/>
+            </a:prstGeom>
+            <a:grpFill/>
+            <a:ln w="19050" cmpd="sng">
+              <a:solidFill>
+                <a:schemeClr val="tx1"/>
+              </a:solidFill>
+              <a:headEnd type="none" w="med" len="med"/>
+              <a:tailEnd type="arrow" w="med" len="med"/>
+            </a:ln>
+            <a:effectLst/>
+          </p:spPr>
+          <p:style>
+            <a:lnRef idx="2">
+              <a:schemeClr val="accent1"/>
+            </a:lnRef>
+            <a:fillRef idx="0">
+              <a:schemeClr val="accent1"/>
+            </a:fillRef>
+            <a:effectRef idx="1">
+              <a:schemeClr val="accent1"/>
+            </a:effectRef>
+            <a:fontRef idx="minor">
+              <a:schemeClr val="tx1"/>
+            </a:fontRef>
+          </p:style>
+        </p:cxnSp>
+        <p:cxnSp>
+          <p:nvCxnSpPr>
+            <p:cNvPr id="82" name="Straight Arrow Connector 81">
+              <a:extLst>
+                <a:ext uri="{FF2B5EF4-FFF2-40B4-BE49-F238E27FC236}">
+                  <a16:creationId xmlns:a16="http://schemas.microsoft.com/office/drawing/2014/main" id="{71B98D2F-C4A9-7F4A-BE3B-2F934058A4B0}"/>
+                </a:ext>
+              </a:extLst>
+            </p:cNvPr>
+            <p:cNvCxnSpPr/>
+            <p:nvPr/>
+          </p:nvCxnSpPr>
+          <p:spPr>
+            <a:xfrm>
+              <a:off x="3612754" y="2984384"/>
+              <a:ext cx="0" cy="889771"/>
+            </a:xfrm>
+            <a:prstGeom prst="straightConnector1">
+              <a:avLst/>
+            </a:prstGeom>
+            <a:grpFill/>
+            <a:ln w="19050" cmpd="sng">
+              <a:solidFill>
+                <a:schemeClr val="tx1"/>
+              </a:solidFill>
+              <a:headEnd type="none" w="med" len="med"/>
+              <a:tailEnd type="arrow" w="med" len="med"/>
+            </a:ln>
+            <a:effectLst/>
+          </p:spPr>
+          <p:style>
+            <a:lnRef idx="2">
+              <a:schemeClr val="accent1"/>
+            </a:lnRef>
+            <a:fillRef idx="0">
+              <a:schemeClr val="accent1"/>
+            </a:fillRef>
+            <a:effectRef idx="1">
+              <a:schemeClr val="accent1"/>
+            </a:effectRef>
+            <a:fontRef idx="minor">
+              <a:schemeClr val="tx1"/>
+            </a:fontRef>
+          </p:style>
+        </p:cxnSp>
+      </p:grpSp>
+      <p:cxnSp>
+        <p:nvCxnSpPr>
+          <p:cNvPr id="83" name="Straight Arrow Connector 82">
+            <a:extLst>
+              <a:ext uri="{FF2B5EF4-FFF2-40B4-BE49-F238E27FC236}">
+                <a16:creationId xmlns:a16="http://schemas.microsoft.com/office/drawing/2014/main" id="{C73EDFAD-DB03-5640-82FF-A2A2267534DE}"/>
+              </a:ext>
+            </a:extLst>
+          </p:cNvPr>
+          <p:cNvCxnSpPr>
+            <a:cxnSpLocks/>
+          </p:cNvCxnSpPr>
+          <p:nvPr/>
+        </p:nvCxnSpPr>
+        <p:spPr>
+          <a:xfrm>
+            <a:off x="4301891" y="2650090"/>
+            <a:ext cx="0" cy="222457"/>
+          </a:xfrm>
+          <a:prstGeom prst="straightConnector1">
+            <a:avLst/>
+          </a:prstGeom>
+          <a:ln>
+            <a:solidFill>
+              <a:schemeClr val="tx1"/>
+            </a:solidFill>
+            <a:tailEnd type="arrow"/>
+          </a:ln>
+          <a:effectLst/>
+        </p:spPr>
+        <p:style>
+          <a:lnRef idx="2">
+            <a:schemeClr val="accent1"/>
+          </a:lnRef>
+          <a:fillRef idx="0">
+            <a:schemeClr val="accent1"/>
+          </a:fillRef>
+          <a:effectRef idx="1">
+            <a:schemeClr val="accent1"/>
+          </a:effectRef>
+          <a:fontRef idx="minor">
+            <a:schemeClr val="tx1"/>
+          </a:fontRef>
+        </p:style>
+      </p:cxnSp>
+      <p:sp>
+        <p:nvSpPr>
+          <p:cNvPr id="84" name="TextBox 83">
+            <a:extLst>
+              <a:ext uri="{FF2B5EF4-FFF2-40B4-BE49-F238E27FC236}">
+                <a16:creationId xmlns:a16="http://schemas.microsoft.com/office/drawing/2014/main" id="{CA957AAB-53F9-7743-B1BF-A9DF6C360466}"/>
+              </a:ext>
+            </a:extLst>
+          </p:cNvPr>
+          <p:cNvSpPr txBox="1"/>
+          <p:nvPr/>
+        </p:nvSpPr>
+        <p:spPr>
+          <a:xfrm>
+            <a:off x="4035596" y="2399267"/>
+            <a:ext cx="657532" cy="246221"/>
+          </a:xfrm>
+          <a:prstGeom prst="rect">
+            <a:avLst/>
+          </a:prstGeom>
+          <a:noFill/>
+        </p:spPr>
+        <p:txBody>
+          <a:bodyPr wrap="square" lIns="0" tIns="0" rIns="0" bIns="0" rtlCol="0">
+            <a:spAutoFit/>
+          </a:bodyPr>
+          <a:lstStyle/>
+          <a:p>
+            <a:r>
+              <a:rPr lang="en-US" sz="1600" dirty="0"/>
+              <a:t>k</a:t>
+            </a:r>
+            <a:r>
+              <a:rPr lang="en-US" sz="1600" baseline="-25000" dirty="0"/>
+              <a:t>synTm</a:t>
+            </a:r>
+          </a:p>
+        </p:txBody>
+      </p:sp>
+      <p:cxnSp>
+        <p:nvCxnSpPr>
+          <p:cNvPr id="85" name="Straight Arrow Connector 84">
+            <a:extLst>
+              <a:ext uri="{FF2B5EF4-FFF2-40B4-BE49-F238E27FC236}">
+                <a16:creationId xmlns:a16="http://schemas.microsoft.com/office/drawing/2014/main" id="{B60CA70F-7ABC-7E4B-A3C5-B7C7642D1DFE}"/>
+              </a:ext>
+            </a:extLst>
+          </p:cNvPr>
+          <p:cNvCxnSpPr/>
+          <p:nvPr/>
+        </p:nvCxnSpPr>
+        <p:spPr>
+          <a:xfrm>
+            <a:off x="4575046" y="3508513"/>
+            <a:ext cx="0" cy="290677"/>
+          </a:xfrm>
+          <a:prstGeom prst="straightConnector1">
+            <a:avLst/>
+          </a:prstGeom>
+          <a:ln>
+            <a:solidFill>
+              <a:schemeClr val="tx1"/>
+            </a:solidFill>
+            <a:tailEnd type="arrow"/>
+          </a:ln>
+          <a:effectLst/>
+        </p:spPr>
+        <p:style>
+          <a:lnRef idx="2">
+            <a:schemeClr val="accent1"/>
+          </a:lnRef>
+          <a:fillRef idx="0">
+            <a:schemeClr val="accent1"/>
+          </a:fillRef>
+          <a:effectRef idx="1">
+            <a:schemeClr val="accent1"/>
+          </a:effectRef>
+          <a:fontRef idx="minor">
+            <a:schemeClr val="tx1"/>
+          </a:fontRef>
+        </p:style>
+      </p:cxnSp>
+      <p:sp>
+        <p:nvSpPr>
+          <p:cNvPr id="86" name="TextBox 85">
+            <a:extLst>
+              <a:ext uri="{FF2B5EF4-FFF2-40B4-BE49-F238E27FC236}">
+                <a16:creationId xmlns:a16="http://schemas.microsoft.com/office/drawing/2014/main" id="{13950FF4-5A94-CB41-AEA7-E4E915C1FFA2}"/>
+              </a:ext>
+            </a:extLst>
+          </p:cNvPr>
+          <p:cNvSpPr txBox="1"/>
+          <p:nvPr/>
+        </p:nvSpPr>
+        <p:spPr>
+          <a:xfrm>
+            <a:off x="4614472" y="3474166"/>
+            <a:ext cx="657532" cy="246221"/>
+          </a:xfrm>
+          <a:prstGeom prst="rect">
+            <a:avLst/>
+          </a:prstGeom>
+          <a:noFill/>
+        </p:spPr>
+        <p:txBody>
+          <a:bodyPr wrap="square" lIns="0" tIns="0" rIns="0" bIns="0" rtlCol="0">
+            <a:spAutoFit/>
+          </a:bodyPr>
+          <a:lstStyle/>
+          <a:p>
+            <a:r>
+              <a:rPr lang="en-US" sz="1600" dirty="0"/>
+              <a:t>k</a:t>
+            </a:r>
+            <a:r>
+              <a:rPr lang="en-US" sz="1600" baseline="-25000" dirty="0"/>
+              <a:t>eTm</a:t>
+            </a:r>
+          </a:p>
+        </p:txBody>
+      </p:sp>
+      <p:sp>
+        <p:nvSpPr>
+          <p:cNvPr id="87" name="Explosion 2 86">
+            <a:extLst>
+              <a:ext uri="{FF2B5EF4-FFF2-40B4-BE49-F238E27FC236}">
+                <a16:creationId xmlns:a16="http://schemas.microsoft.com/office/drawing/2014/main" id="{A991E102-1EE3-A44E-ACF8-AA4CCDE78331}"/>
+              </a:ext>
+            </a:extLst>
+          </p:cNvPr>
+          <p:cNvSpPr/>
+          <p:nvPr/>
+        </p:nvSpPr>
+        <p:spPr>
+          <a:xfrm>
+            <a:off x="5948040" y="1154369"/>
+            <a:ext cx="1259995" cy="927159"/>
+          </a:xfrm>
+          <a:prstGeom prst="irregularSeal2">
+            <a:avLst/>
+          </a:prstGeom>
+          <a:solidFill>
+            <a:schemeClr val="accent1">
+              <a:lumMod val="20000"/>
+              <a:lumOff val="80000"/>
+            </a:schemeClr>
+          </a:solidFill>
+          <a:ln w="3175">
+            <a:solidFill>
+              <a:schemeClr val="tx1"/>
+            </a:solidFill>
+          </a:ln>
+          <a:effectLst/>
+        </p:spPr>
+        <p:style>
+          <a:lnRef idx="2">
+            <a:schemeClr val="accent1"/>
+          </a:lnRef>
+          <a:fillRef idx="0">
+            <a:schemeClr val="accent1"/>
+          </a:fillRef>
+          <a:effectRef idx="1">
+            <a:schemeClr val="accent1"/>
+          </a:effectRef>
+          <a:fontRef idx="minor">
+            <a:schemeClr val="tx1"/>
+          </a:fontRef>
+        </p:style>
+        <p:txBody>
+          <a:bodyPr lIns="0" tIns="0" rIns="0" bIns="0" rtlCol="0" anchor="ctr"/>
+          <a:lstStyle/>
+          <a:p>
+            <a:pPr algn="ctr"/>
+            <a:r>
+              <a:rPr lang="en-US" sz="1400" dirty="0"/>
+              <a:t>Signal</a:t>
+            </a:r>
+          </a:p>
+        </p:txBody>
+      </p:sp>
+      <p:sp>
+        <p:nvSpPr>
+          <p:cNvPr id="88" name="TextBox 87">
+            <a:extLst>
+              <a:ext uri="{FF2B5EF4-FFF2-40B4-BE49-F238E27FC236}">
+                <a16:creationId xmlns:a16="http://schemas.microsoft.com/office/drawing/2014/main" id="{CE15BC26-1C68-654E-8831-45C20D839CB3}"/>
+              </a:ext>
+            </a:extLst>
+          </p:cNvPr>
+          <p:cNvSpPr txBox="1"/>
+          <p:nvPr/>
+        </p:nvSpPr>
+        <p:spPr>
+          <a:xfrm>
+            <a:off x="2549334" y="2466161"/>
+            <a:ext cx="1230850" cy="246221"/>
+          </a:xfrm>
+          <a:prstGeom prst="rect">
+            <a:avLst/>
+          </a:prstGeom>
+          <a:noFill/>
+        </p:spPr>
+        <p:txBody>
+          <a:bodyPr wrap="square" lIns="0" tIns="0" rIns="0" bIns="0" rtlCol="0">
+            <a:spAutoFit/>
+          </a:bodyPr>
+          <a:lstStyle/>
+          <a:p>
+            <a:pPr algn="ctr"/>
+            <a:r>
+              <a:rPr lang="en-US" sz="1600" dirty="0"/>
+              <a:t>k</a:t>
+            </a:r>
+            <a:r>
+              <a:rPr lang="en-US" sz="1600" baseline="-25000" dirty="0"/>
+              <a:t>onDT      </a:t>
+            </a:r>
+            <a:r>
+              <a:rPr lang="en-US" sz="1600" dirty="0"/>
+              <a:t>k</a:t>
+            </a:r>
+            <a:r>
+              <a:rPr lang="en-US" sz="1600" baseline="-25000" dirty="0"/>
+              <a:t>offDT</a:t>
+            </a:r>
+          </a:p>
+        </p:txBody>
+      </p:sp>
+      <p:sp>
+        <p:nvSpPr>
+          <p:cNvPr id="89" name="TextBox 88">
+            <a:extLst>
+              <a:ext uri="{FF2B5EF4-FFF2-40B4-BE49-F238E27FC236}">
+                <a16:creationId xmlns:a16="http://schemas.microsoft.com/office/drawing/2014/main" id="{5276A760-07BA-304F-9CB3-5D80757A5407}"/>
+              </a:ext>
+            </a:extLst>
+          </p:cNvPr>
+          <p:cNvSpPr txBox="1"/>
+          <p:nvPr/>
+        </p:nvSpPr>
+        <p:spPr>
+          <a:xfrm>
+            <a:off x="4717190" y="2466161"/>
+            <a:ext cx="1230850" cy="246221"/>
+          </a:xfrm>
+          <a:prstGeom prst="rect">
+            <a:avLst/>
+          </a:prstGeom>
+          <a:noFill/>
+        </p:spPr>
+        <p:txBody>
+          <a:bodyPr wrap="square" lIns="0" tIns="0" rIns="0" bIns="0" rtlCol="0">
+            <a:spAutoFit/>
+          </a:bodyPr>
+          <a:lstStyle/>
+          <a:p>
+            <a:pPr algn="ctr"/>
+            <a:r>
+              <a:rPr lang="en-US" sz="1600" dirty="0"/>
+              <a:t>k</a:t>
+            </a:r>
+            <a:r>
+              <a:rPr lang="en-US" sz="1600" baseline="-25000" dirty="0"/>
+              <a:t>onTL      </a:t>
+            </a:r>
+            <a:r>
+              <a:rPr lang="en-US" sz="1600" dirty="0"/>
+              <a:t>k</a:t>
+            </a:r>
+            <a:r>
+              <a:rPr lang="en-US" sz="1600" baseline="-25000" dirty="0"/>
+              <a:t>offTL</a:t>
+            </a:r>
+          </a:p>
+        </p:txBody>
+      </p:sp>
     </p:spTree>
     <p:extLst>
       <p:ext uri="{BB962C8B-B14F-4D97-AF65-F5344CB8AC3E}">
-        <p14:creationId xmlns:p14="http://schemas.microsoft.com/office/powerpoint/2010/main" val="941804289"/>
+        <p14:creationId xmlns:p14="http://schemas.microsoft.com/office/powerpoint/2010/main" val="1381370892"/>
       </p:ext>
     </p:extLst>
   </p:cSld>

</xml_diff>